<commit_message>
Edit README.md Edit Lesson_10a.pptx
Signed-off-by: Joseph Catanzarite <jcatanza@users.noreply.github.com>
</commit_message>
<xml_diff>
--- a/fastai_course2_meetup/Foundations_Lesson_10a.pptx
+++ b/fastai_course2_meetup/Foundations_Lesson_10a.pptx
@@ -6,19 +6,20 @@
     <p:sldMasterId id="2147483661" r:id="rId3"/>
     <p:sldMasterId id="2147483674" r:id="rId4"/>
     <p:sldMasterId id="2147483687" r:id="rId5"/>
+    <p:sldMasterId id="2147483700" r:id="rId6"/>
   </p:sldMasterIdLst>
   <p:sldIdLst>
-    <p:sldId id="256" r:id="rId6"/>
-    <p:sldId id="257" r:id="rId7"/>
-    <p:sldId id="258" r:id="rId8"/>
-    <p:sldId id="259" r:id="rId9"/>
-    <p:sldId id="260" r:id="rId10"/>
-    <p:sldId id="261" r:id="rId11"/>
-    <p:sldId id="262" r:id="rId12"/>
-    <p:sldId id="263" r:id="rId13"/>
-    <p:sldId id="264" r:id="rId14"/>
-    <p:sldId id="265" r:id="rId15"/>
-    <p:sldId id="266" r:id="rId16"/>
+    <p:sldId id="256" r:id="rId7"/>
+    <p:sldId id="257" r:id="rId8"/>
+    <p:sldId id="258" r:id="rId9"/>
+    <p:sldId id="259" r:id="rId10"/>
+    <p:sldId id="260" r:id="rId11"/>
+    <p:sldId id="261" r:id="rId12"/>
+    <p:sldId id="262" r:id="rId13"/>
+    <p:sldId id="263" r:id="rId14"/>
+    <p:sldId id="264" r:id="rId15"/>
+    <p:sldId id="265" r:id="rId16"/>
+    <p:sldId id="266" r:id="rId17"/>
   </p:sldIdLst>
   <p:sldSz cx="10080625" cy="5670550"/>
   <p:notesSz cx="7772400" cy="10058400"/>
@@ -77,7 +78,7 @@
         <p:spPr>
           <a:xfrm>
             <a:off x="504000" y="210600"/>
-            <a:ext cx="7019640" cy="946800"/>
+            <a:ext cx="7019280" cy="946800"/>
           </a:xfrm>
           <a:prstGeom prst="rect">
             <a:avLst/>
@@ -108,7 +109,7 @@
         <p:spPr>
           <a:xfrm>
             <a:off x="504000" y="1326600"/>
-            <a:ext cx="9072000" cy="1568520"/>
+            <a:ext cx="9071640" cy="1568160"/>
           </a:xfrm>
           <a:prstGeom prst="rect">
             <a:avLst/>
@@ -137,8 +138,8 @@
         </p:nvSpPr>
         <p:spPr>
           <a:xfrm>
-            <a:off x="504000" y="3044520"/>
-            <a:ext cx="9072000" cy="1568520"/>
+            <a:off x="504000" y="3044160"/>
+            <a:ext cx="9071640" cy="1568160"/>
           </a:xfrm>
           <a:prstGeom prst="rect">
             <a:avLst/>
@@ -190,7 +191,7 @@
         <p:spPr>
           <a:xfrm>
             <a:off x="504000" y="210600"/>
-            <a:ext cx="7019640" cy="946800"/>
+            <a:ext cx="7019280" cy="946800"/>
           </a:xfrm>
           <a:prstGeom prst="rect">
             <a:avLst/>
@@ -221,7 +222,7 @@
         <p:spPr>
           <a:xfrm>
             <a:off x="504000" y="1326600"/>
-            <a:ext cx="4426920" cy="1568520"/>
+            <a:ext cx="4426920" cy="1568160"/>
           </a:xfrm>
           <a:prstGeom prst="rect">
             <a:avLst/>
@@ -251,7 +252,7 @@
         <p:spPr>
           <a:xfrm>
             <a:off x="5152680" y="1326600"/>
-            <a:ext cx="4426920" cy="1568520"/>
+            <a:ext cx="4426920" cy="1568160"/>
           </a:xfrm>
           <a:prstGeom prst="rect">
             <a:avLst/>
@@ -280,8 +281,8 @@
         </p:nvSpPr>
         <p:spPr>
           <a:xfrm>
-            <a:off x="504000" y="3044520"/>
-            <a:ext cx="4426920" cy="1568520"/>
+            <a:off x="504000" y="3044160"/>
+            <a:ext cx="4426920" cy="1568160"/>
           </a:xfrm>
           <a:prstGeom prst="rect">
             <a:avLst/>
@@ -310,8 +311,8 @@
         </p:nvSpPr>
         <p:spPr>
           <a:xfrm>
-            <a:off x="5152680" y="3044520"/>
-            <a:ext cx="4426920" cy="1568520"/>
+            <a:off x="5152680" y="3044160"/>
+            <a:ext cx="4426920" cy="1568160"/>
           </a:xfrm>
           <a:prstGeom prst="rect">
             <a:avLst/>
@@ -363,7 +364,7 @@
         <p:spPr>
           <a:xfrm>
             <a:off x="504000" y="210600"/>
-            <a:ext cx="7019640" cy="946800"/>
+            <a:ext cx="7019280" cy="946800"/>
           </a:xfrm>
           <a:prstGeom prst="rect">
             <a:avLst/>
@@ -394,7 +395,7 @@
         <p:spPr>
           <a:xfrm>
             <a:off x="504000" y="1326600"/>
-            <a:ext cx="2921040" cy="1568520"/>
+            <a:ext cx="2920680" cy="1568160"/>
           </a:xfrm>
           <a:prstGeom prst="rect">
             <a:avLst/>
@@ -423,8 +424,8 @@
         </p:nvSpPr>
         <p:spPr>
           <a:xfrm>
-            <a:off x="3571560" y="1326600"/>
-            <a:ext cx="2921040" cy="1568520"/>
+            <a:off x="3571200" y="1326600"/>
+            <a:ext cx="2920680" cy="1568160"/>
           </a:xfrm>
           <a:prstGeom prst="rect">
             <a:avLst/>
@@ -453,8 +454,8 @@
         </p:nvSpPr>
         <p:spPr>
           <a:xfrm>
-            <a:off x="6639120" y="1326600"/>
-            <a:ext cx="2921040" cy="1568520"/>
+            <a:off x="6638040" y="1326600"/>
+            <a:ext cx="2920680" cy="1568160"/>
           </a:xfrm>
           <a:prstGeom prst="rect">
             <a:avLst/>
@@ -483,8 +484,8 @@
         </p:nvSpPr>
         <p:spPr>
           <a:xfrm>
-            <a:off x="504000" y="3044520"/>
-            <a:ext cx="2921040" cy="1568520"/>
+            <a:off x="504000" y="3044160"/>
+            <a:ext cx="2920680" cy="1568160"/>
           </a:xfrm>
           <a:prstGeom prst="rect">
             <a:avLst/>
@@ -513,8 +514,8 @@
         </p:nvSpPr>
         <p:spPr>
           <a:xfrm>
-            <a:off x="3571560" y="3044520"/>
-            <a:ext cx="2921040" cy="1568520"/>
+            <a:off x="3571200" y="3044160"/>
+            <a:ext cx="2920680" cy="1568160"/>
           </a:xfrm>
           <a:prstGeom prst="rect">
             <a:avLst/>
@@ -543,8 +544,8 @@
         </p:nvSpPr>
         <p:spPr>
           <a:xfrm>
-            <a:off x="6639120" y="3044520"/>
-            <a:ext cx="2921040" cy="1568520"/>
+            <a:off x="6638040" y="3044160"/>
+            <a:ext cx="2920680" cy="1568160"/>
           </a:xfrm>
           <a:prstGeom prst="rect">
             <a:avLst/>
@@ -618,7 +619,7 @@
         <p:spPr>
           <a:xfrm>
             <a:off x="504000" y="210600"/>
-            <a:ext cx="7019640" cy="946800"/>
+            <a:ext cx="7019280" cy="946800"/>
           </a:xfrm>
           <a:prstGeom prst="rect">
             <a:avLst/>
@@ -649,7 +650,7 @@
         <p:spPr>
           <a:xfrm>
             <a:off x="504000" y="1326600"/>
-            <a:ext cx="9072000" cy="3288600"/>
+            <a:ext cx="9071640" cy="3288240"/>
           </a:xfrm>
           <a:prstGeom prst="rect">
             <a:avLst/>
@@ -702,7 +703,7 @@
         <p:spPr>
           <a:xfrm>
             <a:off x="504000" y="210600"/>
-            <a:ext cx="7019640" cy="946800"/>
+            <a:ext cx="7019280" cy="946800"/>
           </a:xfrm>
           <a:prstGeom prst="rect">
             <a:avLst/>
@@ -733,7 +734,7 @@
         <p:spPr>
           <a:xfrm>
             <a:off x="504000" y="1326600"/>
-            <a:ext cx="9072000" cy="3288600"/>
+            <a:ext cx="9071640" cy="3288240"/>
           </a:xfrm>
           <a:prstGeom prst="rect">
             <a:avLst/>
@@ -785,7 +786,7 @@
         <p:spPr>
           <a:xfrm>
             <a:off x="504000" y="210600"/>
-            <a:ext cx="7019640" cy="946800"/>
+            <a:ext cx="7019280" cy="946800"/>
           </a:xfrm>
           <a:prstGeom prst="rect">
             <a:avLst/>
@@ -816,7 +817,7 @@
         <p:spPr>
           <a:xfrm>
             <a:off x="504000" y="1326600"/>
-            <a:ext cx="4426920" cy="3288600"/>
+            <a:ext cx="4426920" cy="3288240"/>
           </a:xfrm>
           <a:prstGeom prst="rect">
             <a:avLst/>
@@ -846,7 +847,7 @@
         <p:spPr>
           <a:xfrm>
             <a:off x="5152680" y="1326600"/>
-            <a:ext cx="4426920" cy="3288600"/>
+            <a:ext cx="4426920" cy="3288240"/>
           </a:xfrm>
           <a:prstGeom prst="rect">
             <a:avLst/>
@@ -898,7 +899,7 @@
         <p:spPr>
           <a:xfrm>
             <a:off x="504000" y="210600"/>
-            <a:ext cx="7019640" cy="946800"/>
+            <a:ext cx="7019280" cy="946800"/>
           </a:xfrm>
           <a:prstGeom prst="rect">
             <a:avLst/>
@@ -951,7 +952,7 @@
         <p:spPr>
           <a:xfrm>
             <a:off x="504000" y="210600"/>
-            <a:ext cx="7019640" cy="4390200"/>
+            <a:ext cx="7019280" cy="4390200"/>
           </a:xfrm>
           <a:prstGeom prst="rect">
             <a:avLst/>
@@ -1004,7 +1005,7 @@
         <p:spPr>
           <a:xfrm>
             <a:off x="504000" y="210600"/>
-            <a:ext cx="7019640" cy="946800"/>
+            <a:ext cx="7019280" cy="946800"/>
           </a:xfrm>
           <a:prstGeom prst="rect">
             <a:avLst/>
@@ -1035,7 +1036,7 @@
         <p:spPr>
           <a:xfrm>
             <a:off x="504000" y="1326600"/>
-            <a:ext cx="4426920" cy="1568520"/>
+            <a:ext cx="4426920" cy="1568160"/>
           </a:xfrm>
           <a:prstGeom prst="rect">
             <a:avLst/>
@@ -1065,7 +1066,7 @@
         <p:spPr>
           <a:xfrm>
             <a:off x="5152680" y="1326600"/>
-            <a:ext cx="4426920" cy="3288600"/>
+            <a:ext cx="4426920" cy="3288240"/>
           </a:xfrm>
           <a:prstGeom prst="rect">
             <a:avLst/>
@@ -1094,8 +1095,8 @@
         </p:nvSpPr>
         <p:spPr>
           <a:xfrm>
-            <a:off x="504000" y="3044520"/>
-            <a:ext cx="4426920" cy="1568520"/>
+            <a:off x="504000" y="3044160"/>
+            <a:ext cx="4426920" cy="1568160"/>
           </a:xfrm>
           <a:prstGeom prst="rect">
             <a:avLst/>
@@ -1147,7 +1148,7 @@
         <p:spPr>
           <a:xfrm>
             <a:off x="504000" y="210600"/>
-            <a:ext cx="7019640" cy="946800"/>
+            <a:ext cx="7019280" cy="946800"/>
           </a:xfrm>
           <a:prstGeom prst="rect">
             <a:avLst/>
@@ -1178,7 +1179,7 @@
         <p:spPr>
           <a:xfrm>
             <a:off x="504000" y="1326600"/>
-            <a:ext cx="9072000" cy="3288600"/>
+            <a:ext cx="9071640" cy="3288240"/>
           </a:xfrm>
           <a:prstGeom prst="rect">
             <a:avLst/>
@@ -1231,7 +1232,7 @@
         <p:spPr>
           <a:xfrm>
             <a:off x="504000" y="210600"/>
-            <a:ext cx="7019640" cy="946800"/>
+            <a:ext cx="7019280" cy="946800"/>
           </a:xfrm>
           <a:prstGeom prst="rect">
             <a:avLst/>
@@ -1262,7 +1263,7 @@
         <p:spPr>
           <a:xfrm>
             <a:off x="504000" y="1326600"/>
-            <a:ext cx="4426920" cy="3288600"/>
+            <a:ext cx="4426920" cy="3288240"/>
           </a:xfrm>
           <a:prstGeom prst="rect">
             <a:avLst/>
@@ -1292,7 +1293,7 @@
         <p:spPr>
           <a:xfrm>
             <a:off x="5152680" y="1326600"/>
-            <a:ext cx="4426920" cy="1568520"/>
+            <a:ext cx="4426920" cy="1568160"/>
           </a:xfrm>
           <a:prstGeom prst="rect">
             <a:avLst/>
@@ -1321,8 +1322,8 @@
         </p:nvSpPr>
         <p:spPr>
           <a:xfrm>
-            <a:off x="5152680" y="3044520"/>
-            <a:ext cx="4426920" cy="1568520"/>
+            <a:off x="5152680" y="3044160"/>
+            <a:ext cx="4426920" cy="1568160"/>
           </a:xfrm>
           <a:prstGeom prst="rect">
             <a:avLst/>
@@ -1374,7 +1375,7 @@
         <p:spPr>
           <a:xfrm>
             <a:off x="504000" y="210600"/>
-            <a:ext cx="7019640" cy="946800"/>
+            <a:ext cx="7019280" cy="946800"/>
           </a:xfrm>
           <a:prstGeom prst="rect">
             <a:avLst/>
@@ -1405,7 +1406,7 @@
         <p:spPr>
           <a:xfrm>
             <a:off x="504000" y="1326600"/>
-            <a:ext cx="4426920" cy="1568520"/>
+            <a:ext cx="4426920" cy="1568160"/>
           </a:xfrm>
           <a:prstGeom prst="rect">
             <a:avLst/>
@@ -1435,7 +1436,7 @@
         <p:spPr>
           <a:xfrm>
             <a:off x="5152680" y="1326600"/>
-            <a:ext cx="4426920" cy="1568520"/>
+            <a:ext cx="4426920" cy="1568160"/>
           </a:xfrm>
           <a:prstGeom prst="rect">
             <a:avLst/>
@@ -1464,8 +1465,8 @@
         </p:nvSpPr>
         <p:spPr>
           <a:xfrm>
-            <a:off x="504000" y="3044520"/>
-            <a:ext cx="9072000" cy="1568520"/>
+            <a:off x="504000" y="3044160"/>
+            <a:ext cx="9071640" cy="1568160"/>
           </a:xfrm>
           <a:prstGeom prst="rect">
             <a:avLst/>
@@ -1517,7 +1518,7 @@
         <p:spPr>
           <a:xfrm>
             <a:off x="504000" y="210600"/>
-            <a:ext cx="7019640" cy="946800"/>
+            <a:ext cx="7019280" cy="946800"/>
           </a:xfrm>
           <a:prstGeom prst="rect">
             <a:avLst/>
@@ -1548,7 +1549,7 @@
         <p:spPr>
           <a:xfrm>
             <a:off x="504000" y="1326600"/>
-            <a:ext cx="9072000" cy="1568520"/>
+            <a:ext cx="9071640" cy="1568160"/>
           </a:xfrm>
           <a:prstGeom prst="rect">
             <a:avLst/>
@@ -1577,8 +1578,8 @@
         </p:nvSpPr>
         <p:spPr>
           <a:xfrm>
-            <a:off x="504000" y="3044520"/>
-            <a:ext cx="9072000" cy="1568520"/>
+            <a:off x="504000" y="3044160"/>
+            <a:ext cx="9071640" cy="1568160"/>
           </a:xfrm>
           <a:prstGeom prst="rect">
             <a:avLst/>
@@ -1630,7 +1631,7 @@
         <p:spPr>
           <a:xfrm>
             <a:off x="504000" y="210600"/>
-            <a:ext cx="7019640" cy="946800"/>
+            <a:ext cx="7019280" cy="946800"/>
           </a:xfrm>
           <a:prstGeom prst="rect">
             <a:avLst/>
@@ -1661,7 +1662,7 @@
         <p:spPr>
           <a:xfrm>
             <a:off x="504000" y="1326600"/>
-            <a:ext cx="4426920" cy="1568520"/>
+            <a:ext cx="4426920" cy="1568160"/>
           </a:xfrm>
           <a:prstGeom prst="rect">
             <a:avLst/>
@@ -1691,7 +1692,7 @@
         <p:spPr>
           <a:xfrm>
             <a:off x="5152680" y="1326600"/>
-            <a:ext cx="4426920" cy="1568520"/>
+            <a:ext cx="4426920" cy="1568160"/>
           </a:xfrm>
           <a:prstGeom prst="rect">
             <a:avLst/>
@@ -1720,8 +1721,8 @@
         </p:nvSpPr>
         <p:spPr>
           <a:xfrm>
-            <a:off x="504000" y="3044520"/>
-            <a:ext cx="4426920" cy="1568520"/>
+            <a:off x="504000" y="3044160"/>
+            <a:ext cx="4426920" cy="1568160"/>
           </a:xfrm>
           <a:prstGeom prst="rect">
             <a:avLst/>
@@ -1750,8 +1751,8 @@
         </p:nvSpPr>
         <p:spPr>
           <a:xfrm>
-            <a:off x="5152680" y="3044520"/>
-            <a:ext cx="4426920" cy="1568520"/>
+            <a:off x="5152680" y="3044160"/>
+            <a:ext cx="4426920" cy="1568160"/>
           </a:xfrm>
           <a:prstGeom prst="rect">
             <a:avLst/>
@@ -1803,7 +1804,7 @@
         <p:spPr>
           <a:xfrm>
             <a:off x="504000" y="210600"/>
-            <a:ext cx="7019640" cy="946800"/>
+            <a:ext cx="7019280" cy="946800"/>
           </a:xfrm>
           <a:prstGeom prst="rect">
             <a:avLst/>
@@ -1834,7 +1835,7 @@
         <p:spPr>
           <a:xfrm>
             <a:off x="504000" y="1326600"/>
-            <a:ext cx="2921040" cy="1568520"/>
+            <a:ext cx="2920680" cy="1568160"/>
           </a:xfrm>
           <a:prstGeom prst="rect">
             <a:avLst/>
@@ -1863,8 +1864,8 @@
         </p:nvSpPr>
         <p:spPr>
           <a:xfrm>
-            <a:off x="3571560" y="1326600"/>
-            <a:ext cx="2921040" cy="1568520"/>
+            <a:off x="3571200" y="1326600"/>
+            <a:ext cx="2920680" cy="1568160"/>
           </a:xfrm>
           <a:prstGeom prst="rect">
             <a:avLst/>
@@ -1893,8 +1894,8 @@
         </p:nvSpPr>
         <p:spPr>
           <a:xfrm>
-            <a:off x="6639120" y="1326600"/>
-            <a:ext cx="2921040" cy="1568520"/>
+            <a:off x="6638040" y="1326600"/>
+            <a:ext cx="2920680" cy="1568160"/>
           </a:xfrm>
           <a:prstGeom prst="rect">
             <a:avLst/>
@@ -1923,8 +1924,8 @@
         </p:nvSpPr>
         <p:spPr>
           <a:xfrm>
-            <a:off x="504000" y="3044520"/>
-            <a:ext cx="2921040" cy="1568520"/>
+            <a:off x="504000" y="3044160"/>
+            <a:ext cx="2920680" cy="1568160"/>
           </a:xfrm>
           <a:prstGeom prst="rect">
             <a:avLst/>
@@ -1953,8 +1954,8 @@
         </p:nvSpPr>
         <p:spPr>
           <a:xfrm>
-            <a:off x="3571560" y="3044520"/>
-            <a:ext cx="2921040" cy="1568520"/>
+            <a:off x="3571200" y="3044160"/>
+            <a:ext cx="2920680" cy="1568160"/>
           </a:xfrm>
           <a:prstGeom prst="rect">
             <a:avLst/>
@@ -1983,8 +1984,8 @@
         </p:nvSpPr>
         <p:spPr>
           <a:xfrm>
-            <a:off x="6639120" y="3044520"/>
-            <a:ext cx="2921040" cy="1568520"/>
+            <a:off x="6638040" y="3044160"/>
+            <a:ext cx="2920680" cy="1568160"/>
           </a:xfrm>
           <a:prstGeom prst="rect">
             <a:avLst/>
@@ -2058,7 +2059,7 @@
         <p:spPr>
           <a:xfrm>
             <a:off x="504000" y="210600"/>
-            <a:ext cx="7019640" cy="946800"/>
+            <a:ext cx="7019280" cy="946800"/>
           </a:xfrm>
           <a:prstGeom prst="rect">
             <a:avLst/>
@@ -2089,7 +2090,7 @@
         <p:spPr>
           <a:xfrm>
             <a:off x="504000" y="1326600"/>
-            <a:ext cx="9072000" cy="3288600"/>
+            <a:ext cx="9071640" cy="3288240"/>
           </a:xfrm>
           <a:prstGeom prst="rect">
             <a:avLst/>
@@ -2142,7 +2143,7 @@
         <p:spPr>
           <a:xfrm>
             <a:off x="504000" y="210600"/>
-            <a:ext cx="7019640" cy="946800"/>
+            <a:ext cx="7019280" cy="946800"/>
           </a:xfrm>
           <a:prstGeom prst="rect">
             <a:avLst/>
@@ -2173,7 +2174,7 @@
         <p:spPr>
           <a:xfrm>
             <a:off x="504000" y="1326600"/>
-            <a:ext cx="9072000" cy="3288600"/>
+            <a:ext cx="9071640" cy="3288240"/>
           </a:xfrm>
           <a:prstGeom prst="rect">
             <a:avLst/>
@@ -2225,7 +2226,7 @@
         <p:spPr>
           <a:xfrm>
             <a:off x="504000" y="210600"/>
-            <a:ext cx="7019640" cy="946800"/>
+            <a:ext cx="7019280" cy="946800"/>
           </a:xfrm>
           <a:prstGeom prst="rect">
             <a:avLst/>
@@ -2256,7 +2257,7 @@
         <p:spPr>
           <a:xfrm>
             <a:off x="504000" y="1326600"/>
-            <a:ext cx="4426920" cy="3288600"/>
+            <a:ext cx="4426920" cy="3288240"/>
           </a:xfrm>
           <a:prstGeom prst="rect">
             <a:avLst/>
@@ -2286,7 +2287,7 @@
         <p:spPr>
           <a:xfrm>
             <a:off x="5152680" y="1326600"/>
-            <a:ext cx="4426920" cy="3288600"/>
+            <a:ext cx="4426920" cy="3288240"/>
           </a:xfrm>
           <a:prstGeom prst="rect">
             <a:avLst/>
@@ -2338,7 +2339,7 @@
         <p:spPr>
           <a:xfrm>
             <a:off x="504000" y="210600"/>
-            <a:ext cx="7019640" cy="946800"/>
+            <a:ext cx="7019280" cy="946800"/>
           </a:xfrm>
           <a:prstGeom prst="rect">
             <a:avLst/>
@@ -2391,7 +2392,7 @@
         <p:spPr>
           <a:xfrm>
             <a:off x="504000" y="210600"/>
-            <a:ext cx="7019640" cy="946800"/>
+            <a:ext cx="7019280" cy="946800"/>
           </a:xfrm>
           <a:prstGeom prst="rect">
             <a:avLst/>
@@ -2422,7 +2423,7 @@
         <p:spPr>
           <a:xfrm>
             <a:off x="504000" y="1326600"/>
-            <a:ext cx="9072000" cy="3288600"/>
+            <a:ext cx="9071640" cy="3288240"/>
           </a:xfrm>
           <a:prstGeom prst="rect">
             <a:avLst/>
@@ -2474,7 +2475,7 @@
         <p:spPr>
           <a:xfrm>
             <a:off x="504000" y="210600"/>
-            <a:ext cx="7019640" cy="4390200"/>
+            <a:ext cx="7019280" cy="4390200"/>
           </a:xfrm>
           <a:prstGeom prst="rect">
             <a:avLst/>
@@ -2527,7 +2528,7 @@
         <p:spPr>
           <a:xfrm>
             <a:off x="504000" y="210600"/>
-            <a:ext cx="7019640" cy="946800"/>
+            <a:ext cx="7019280" cy="946800"/>
           </a:xfrm>
           <a:prstGeom prst="rect">
             <a:avLst/>
@@ -2558,7 +2559,7 @@
         <p:spPr>
           <a:xfrm>
             <a:off x="504000" y="1326600"/>
-            <a:ext cx="4426920" cy="1568520"/>
+            <a:ext cx="4426920" cy="1568160"/>
           </a:xfrm>
           <a:prstGeom prst="rect">
             <a:avLst/>
@@ -2588,7 +2589,7 @@
         <p:spPr>
           <a:xfrm>
             <a:off x="5152680" y="1326600"/>
-            <a:ext cx="4426920" cy="3288600"/>
+            <a:ext cx="4426920" cy="3288240"/>
           </a:xfrm>
           <a:prstGeom prst="rect">
             <a:avLst/>
@@ -2617,8 +2618,8 @@
         </p:nvSpPr>
         <p:spPr>
           <a:xfrm>
-            <a:off x="504000" y="3044520"/>
-            <a:ext cx="4426920" cy="1568520"/>
+            <a:off x="504000" y="3044160"/>
+            <a:ext cx="4426920" cy="1568160"/>
           </a:xfrm>
           <a:prstGeom prst="rect">
             <a:avLst/>
@@ -2670,7 +2671,7 @@
         <p:spPr>
           <a:xfrm>
             <a:off x="504000" y="210600"/>
-            <a:ext cx="7019640" cy="946800"/>
+            <a:ext cx="7019280" cy="946800"/>
           </a:xfrm>
           <a:prstGeom prst="rect">
             <a:avLst/>
@@ -2701,7 +2702,7 @@
         <p:spPr>
           <a:xfrm>
             <a:off x="504000" y="1326600"/>
-            <a:ext cx="4426920" cy="3288600"/>
+            <a:ext cx="4426920" cy="3288240"/>
           </a:xfrm>
           <a:prstGeom prst="rect">
             <a:avLst/>
@@ -2731,7 +2732,7 @@
         <p:spPr>
           <a:xfrm>
             <a:off x="5152680" y="1326600"/>
-            <a:ext cx="4426920" cy="1568520"/>
+            <a:ext cx="4426920" cy="1568160"/>
           </a:xfrm>
           <a:prstGeom prst="rect">
             <a:avLst/>
@@ -2760,8 +2761,8 @@
         </p:nvSpPr>
         <p:spPr>
           <a:xfrm>
-            <a:off x="5152680" y="3044520"/>
-            <a:ext cx="4426920" cy="1568520"/>
+            <a:off x="5152680" y="3044160"/>
+            <a:ext cx="4426920" cy="1568160"/>
           </a:xfrm>
           <a:prstGeom prst="rect">
             <a:avLst/>
@@ -2813,7 +2814,7 @@
         <p:spPr>
           <a:xfrm>
             <a:off x="504000" y="210600"/>
-            <a:ext cx="7019640" cy="946800"/>
+            <a:ext cx="7019280" cy="946800"/>
           </a:xfrm>
           <a:prstGeom prst="rect">
             <a:avLst/>
@@ -2844,7 +2845,7 @@
         <p:spPr>
           <a:xfrm>
             <a:off x="504000" y="1326600"/>
-            <a:ext cx="4426920" cy="1568520"/>
+            <a:ext cx="4426920" cy="1568160"/>
           </a:xfrm>
           <a:prstGeom prst="rect">
             <a:avLst/>
@@ -2874,7 +2875,7 @@
         <p:spPr>
           <a:xfrm>
             <a:off x="5152680" y="1326600"/>
-            <a:ext cx="4426920" cy="1568520"/>
+            <a:ext cx="4426920" cy="1568160"/>
           </a:xfrm>
           <a:prstGeom prst="rect">
             <a:avLst/>
@@ -2903,8 +2904,8 @@
         </p:nvSpPr>
         <p:spPr>
           <a:xfrm>
-            <a:off x="504000" y="3044520"/>
-            <a:ext cx="9072000" cy="1568520"/>
+            <a:off x="504000" y="3044160"/>
+            <a:ext cx="9071640" cy="1568160"/>
           </a:xfrm>
           <a:prstGeom prst="rect">
             <a:avLst/>
@@ -2956,7 +2957,7 @@
         <p:spPr>
           <a:xfrm>
             <a:off x="504000" y="210600"/>
-            <a:ext cx="7019640" cy="946800"/>
+            <a:ext cx="7019280" cy="946800"/>
           </a:xfrm>
           <a:prstGeom prst="rect">
             <a:avLst/>
@@ -2987,7 +2988,7 @@
         <p:spPr>
           <a:xfrm>
             <a:off x="504000" y="1326600"/>
-            <a:ext cx="9072000" cy="1568520"/>
+            <a:ext cx="9071640" cy="1568160"/>
           </a:xfrm>
           <a:prstGeom prst="rect">
             <a:avLst/>
@@ -3016,8 +3017,8 @@
         </p:nvSpPr>
         <p:spPr>
           <a:xfrm>
-            <a:off x="504000" y="3044520"/>
-            <a:ext cx="9072000" cy="1568520"/>
+            <a:off x="504000" y="3044160"/>
+            <a:ext cx="9071640" cy="1568160"/>
           </a:xfrm>
           <a:prstGeom prst="rect">
             <a:avLst/>
@@ -3069,7 +3070,7 @@
         <p:spPr>
           <a:xfrm>
             <a:off x="504000" y="210600"/>
-            <a:ext cx="7019640" cy="946800"/>
+            <a:ext cx="7019280" cy="946800"/>
           </a:xfrm>
           <a:prstGeom prst="rect">
             <a:avLst/>
@@ -3100,7 +3101,7 @@
         <p:spPr>
           <a:xfrm>
             <a:off x="504000" y="1326600"/>
-            <a:ext cx="4426920" cy="1568520"/>
+            <a:ext cx="4426920" cy="1568160"/>
           </a:xfrm>
           <a:prstGeom prst="rect">
             <a:avLst/>
@@ -3130,7 +3131,7 @@
         <p:spPr>
           <a:xfrm>
             <a:off x="5152680" y="1326600"/>
-            <a:ext cx="4426920" cy="1568520"/>
+            <a:ext cx="4426920" cy="1568160"/>
           </a:xfrm>
           <a:prstGeom prst="rect">
             <a:avLst/>
@@ -3159,8 +3160,8 @@
         </p:nvSpPr>
         <p:spPr>
           <a:xfrm>
-            <a:off x="504000" y="3044520"/>
-            <a:ext cx="4426920" cy="1568520"/>
+            <a:off x="504000" y="3044160"/>
+            <a:ext cx="4426920" cy="1568160"/>
           </a:xfrm>
           <a:prstGeom prst="rect">
             <a:avLst/>
@@ -3189,8 +3190,8 @@
         </p:nvSpPr>
         <p:spPr>
           <a:xfrm>
-            <a:off x="5152680" y="3044520"/>
-            <a:ext cx="4426920" cy="1568520"/>
+            <a:off x="5152680" y="3044160"/>
+            <a:ext cx="4426920" cy="1568160"/>
           </a:xfrm>
           <a:prstGeom prst="rect">
             <a:avLst/>
@@ -3242,7 +3243,7 @@
         <p:spPr>
           <a:xfrm>
             <a:off x="504000" y="210600"/>
-            <a:ext cx="7019640" cy="946800"/>
+            <a:ext cx="7019280" cy="946800"/>
           </a:xfrm>
           <a:prstGeom prst="rect">
             <a:avLst/>
@@ -3273,7 +3274,7 @@
         <p:spPr>
           <a:xfrm>
             <a:off x="504000" y="1326600"/>
-            <a:ext cx="2921040" cy="1568520"/>
+            <a:ext cx="2920680" cy="1568160"/>
           </a:xfrm>
           <a:prstGeom prst="rect">
             <a:avLst/>
@@ -3302,8 +3303,8 @@
         </p:nvSpPr>
         <p:spPr>
           <a:xfrm>
-            <a:off x="3571560" y="1326600"/>
-            <a:ext cx="2921040" cy="1568520"/>
+            <a:off x="3571200" y="1326600"/>
+            <a:ext cx="2920680" cy="1568160"/>
           </a:xfrm>
           <a:prstGeom prst="rect">
             <a:avLst/>
@@ -3332,8 +3333,8 @@
         </p:nvSpPr>
         <p:spPr>
           <a:xfrm>
-            <a:off x="6639120" y="1326600"/>
-            <a:ext cx="2921040" cy="1568520"/>
+            <a:off x="6638040" y="1326600"/>
+            <a:ext cx="2920680" cy="1568160"/>
           </a:xfrm>
           <a:prstGeom prst="rect">
             <a:avLst/>
@@ -3362,8 +3363,8 @@
         </p:nvSpPr>
         <p:spPr>
           <a:xfrm>
-            <a:off x="504000" y="3044520"/>
-            <a:ext cx="2921040" cy="1568520"/>
+            <a:off x="504000" y="3044160"/>
+            <a:ext cx="2920680" cy="1568160"/>
           </a:xfrm>
           <a:prstGeom prst="rect">
             <a:avLst/>
@@ -3392,8 +3393,8 @@
         </p:nvSpPr>
         <p:spPr>
           <a:xfrm>
-            <a:off x="3571560" y="3044520"/>
-            <a:ext cx="2921040" cy="1568520"/>
+            <a:off x="3571200" y="3044160"/>
+            <a:ext cx="2920680" cy="1568160"/>
           </a:xfrm>
           <a:prstGeom prst="rect">
             <a:avLst/>
@@ -3422,8 +3423,8 @@
         </p:nvSpPr>
         <p:spPr>
           <a:xfrm>
-            <a:off x="6639120" y="3044520"/>
-            <a:ext cx="2921040" cy="1568520"/>
+            <a:off x="6638040" y="3044160"/>
+            <a:ext cx="2920680" cy="1568160"/>
           </a:xfrm>
           <a:prstGeom prst="rect">
             <a:avLst/>
@@ -3497,7 +3498,7 @@
         <p:spPr>
           <a:xfrm>
             <a:off x="504000" y="210600"/>
-            <a:ext cx="7019640" cy="946800"/>
+            <a:ext cx="7019280" cy="946800"/>
           </a:xfrm>
           <a:prstGeom prst="rect">
             <a:avLst/>
@@ -3528,7 +3529,7 @@
         <p:spPr>
           <a:xfrm>
             <a:off x="504000" y="1326600"/>
-            <a:ext cx="9072000" cy="3288600"/>
+            <a:ext cx="9071640" cy="3288240"/>
           </a:xfrm>
           <a:prstGeom prst="rect">
             <a:avLst/>
@@ -3581,7 +3582,7 @@
         <p:spPr>
           <a:xfrm>
             <a:off x="504000" y="210600"/>
-            <a:ext cx="7019640" cy="946800"/>
+            <a:ext cx="7019280" cy="946800"/>
           </a:xfrm>
           <a:prstGeom prst="rect">
             <a:avLst/>
@@ -3612,7 +3613,7 @@
         <p:spPr>
           <a:xfrm>
             <a:off x="504000" y="1326600"/>
-            <a:ext cx="9072000" cy="3288600"/>
+            <a:ext cx="9071640" cy="3288240"/>
           </a:xfrm>
           <a:prstGeom prst="rect">
             <a:avLst/>
@@ -3664,7 +3665,7 @@
         <p:spPr>
           <a:xfrm>
             <a:off x="504000" y="210600"/>
-            <a:ext cx="7019640" cy="946800"/>
+            <a:ext cx="7019280" cy="946800"/>
           </a:xfrm>
           <a:prstGeom prst="rect">
             <a:avLst/>
@@ -3695,7 +3696,7 @@
         <p:spPr>
           <a:xfrm>
             <a:off x="504000" y="1326600"/>
-            <a:ext cx="4426920" cy="3288600"/>
+            <a:ext cx="4426920" cy="3288240"/>
           </a:xfrm>
           <a:prstGeom prst="rect">
             <a:avLst/>
@@ -3725,7 +3726,7 @@
         <p:spPr>
           <a:xfrm>
             <a:off x="5152680" y="1326600"/>
-            <a:ext cx="4426920" cy="3288600"/>
+            <a:ext cx="4426920" cy="3288240"/>
           </a:xfrm>
           <a:prstGeom prst="rect">
             <a:avLst/>
@@ -3777,7 +3778,7 @@
         <p:spPr>
           <a:xfrm>
             <a:off x="504000" y="210600"/>
-            <a:ext cx="7019640" cy="946800"/>
+            <a:ext cx="7019280" cy="946800"/>
           </a:xfrm>
           <a:prstGeom prst="rect">
             <a:avLst/>
@@ -3808,7 +3809,7 @@
         <p:spPr>
           <a:xfrm>
             <a:off x="504000" y="1326600"/>
-            <a:ext cx="4426920" cy="3288600"/>
+            <a:ext cx="4426920" cy="3288240"/>
           </a:xfrm>
           <a:prstGeom prst="rect">
             <a:avLst/>
@@ -3838,7 +3839,7 @@
         <p:spPr>
           <a:xfrm>
             <a:off x="5152680" y="1326600"/>
-            <a:ext cx="4426920" cy="3288600"/>
+            <a:ext cx="4426920" cy="3288240"/>
           </a:xfrm>
           <a:prstGeom prst="rect">
             <a:avLst/>
@@ -3890,7 +3891,7 @@
         <p:spPr>
           <a:xfrm>
             <a:off x="504000" y="210600"/>
-            <a:ext cx="7019640" cy="946800"/>
+            <a:ext cx="7019280" cy="946800"/>
           </a:xfrm>
           <a:prstGeom prst="rect">
             <a:avLst/>
@@ -3943,7 +3944,7 @@
         <p:spPr>
           <a:xfrm>
             <a:off x="504000" y="210600"/>
-            <a:ext cx="7019640" cy="4390200"/>
+            <a:ext cx="7019280" cy="4390200"/>
           </a:xfrm>
           <a:prstGeom prst="rect">
             <a:avLst/>
@@ -3996,7 +3997,7 @@
         <p:spPr>
           <a:xfrm>
             <a:off x="504000" y="210600"/>
-            <a:ext cx="7019640" cy="946800"/>
+            <a:ext cx="7019280" cy="946800"/>
           </a:xfrm>
           <a:prstGeom prst="rect">
             <a:avLst/>
@@ -4027,7 +4028,7 @@
         <p:spPr>
           <a:xfrm>
             <a:off x="504000" y="1326600"/>
-            <a:ext cx="4426920" cy="1568520"/>
+            <a:ext cx="4426920" cy="1568160"/>
           </a:xfrm>
           <a:prstGeom prst="rect">
             <a:avLst/>
@@ -4057,7 +4058,7 @@
         <p:spPr>
           <a:xfrm>
             <a:off x="5152680" y="1326600"/>
-            <a:ext cx="4426920" cy="3288600"/>
+            <a:ext cx="4426920" cy="3288240"/>
           </a:xfrm>
           <a:prstGeom prst="rect">
             <a:avLst/>
@@ -4086,8 +4087,8 @@
         </p:nvSpPr>
         <p:spPr>
           <a:xfrm>
-            <a:off x="504000" y="3044520"/>
-            <a:ext cx="4426920" cy="1568520"/>
+            <a:off x="504000" y="3044160"/>
+            <a:ext cx="4426920" cy="1568160"/>
           </a:xfrm>
           <a:prstGeom prst="rect">
             <a:avLst/>
@@ -4139,7 +4140,7 @@
         <p:spPr>
           <a:xfrm>
             <a:off x="504000" y="210600"/>
-            <a:ext cx="7019640" cy="946800"/>
+            <a:ext cx="7019280" cy="946800"/>
           </a:xfrm>
           <a:prstGeom prst="rect">
             <a:avLst/>
@@ -4170,7 +4171,7 @@
         <p:spPr>
           <a:xfrm>
             <a:off x="504000" y="1326600"/>
-            <a:ext cx="4426920" cy="3288600"/>
+            <a:ext cx="4426920" cy="3288240"/>
           </a:xfrm>
           <a:prstGeom prst="rect">
             <a:avLst/>
@@ -4200,7 +4201,7 @@
         <p:spPr>
           <a:xfrm>
             <a:off x="5152680" y="1326600"/>
-            <a:ext cx="4426920" cy="1568520"/>
+            <a:ext cx="4426920" cy="1568160"/>
           </a:xfrm>
           <a:prstGeom prst="rect">
             <a:avLst/>
@@ -4229,8 +4230,8 @@
         </p:nvSpPr>
         <p:spPr>
           <a:xfrm>
-            <a:off x="5152680" y="3044520"/>
-            <a:ext cx="4426920" cy="1568520"/>
+            <a:off x="5152680" y="3044160"/>
+            <a:ext cx="4426920" cy="1568160"/>
           </a:xfrm>
           <a:prstGeom prst="rect">
             <a:avLst/>
@@ -4282,7 +4283,7 @@
         <p:spPr>
           <a:xfrm>
             <a:off x="504000" y="210600"/>
-            <a:ext cx="7019640" cy="946800"/>
+            <a:ext cx="7019280" cy="946800"/>
           </a:xfrm>
           <a:prstGeom prst="rect">
             <a:avLst/>
@@ -4313,7 +4314,7 @@
         <p:spPr>
           <a:xfrm>
             <a:off x="504000" y="1326600"/>
-            <a:ext cx="4426920" cy="1568520"/>
+            <a:ext cx="4426920" cy="1568160"/>
           </a:xfrm>
           <a:prstGeom prst="rect">
             <a:avLst/>
@@ -4343,7 +4344,7 @@
         <p:spPr>
           <a:xfrm>
             <a:off x="5152680" y="1326600"/>
-            <a:ext cx="4426920" cy="1568520"/>
+            <a:ext cx="4426920" cy="1568160"/>
           </a:xfrm>
           <a:prstGeom prst="rect">
             <a:avLst/>
@@ -4372,8 +4373,8 @@
         </p:nvSpPr>
         <p:spPr>
           <a:xfrm>
-            <a:off x="504000" y="3044520"/>
-            <a:ext cx="9072000" cy="1568520"/>
+            <a:off x="504000" y="3044160"/>
+            <a:ext cx="9071640" cy="1568160"/>
           </a:xfrm>
           <a:prstGeom prst="rect">
             <a:avLst/>
@@ -4425,7 +4426,7 @@
         <p:spPr>
           <a:xfrm>
             <a:off x="504000" y="210600"/>
-            <a:ext cx="7019640" cy="946800"/>
+            <a:ext cx="7019280" cy="946800"/>
           </a:xfrm>
           <a:prstGeom prst="rect">
             <a:avLst/>
@@ -4456,7 +4457,7 @@
         <p:spPr>
           <a:xfrm>
             <a:off x="504000" y="1326600"/>
-            <a:ext cx="9072000" cy="1568520"/>
+            <a:ext cx="9071640" cy="1568160"/>
           </a:xfrm>
           <a:prstGeom prst="rect">
             <a:avLst/>
@@ -4485,8 +4486,8 @@
         </p:nvSpPr>
         <p:spPr>
           <a:xfrm>
-            <a:off x="504000" y="3044520"/>
-            <a:ext cx="9072000" cy="1568520"/>
+            <a:off x="504000" y="3044160"/>
+            <a:ext cx="9071640" cy="1568160"/>
           </a:xfrm>
           <a:prstGeom prst="rect">
             <a:avLst/>
@@ -4538,7 +4539,7 @@
         <p:spPr>
           <a:xfrm>
             <a:off x="504000" y="210600"/>
-            <a:ext cx="7019640" cy="946800"/>
+            <a:ext cx="7019280" cy="946800"/>
           </a:xfrm>
           <a:prstGeom prst="rect">
             <a:avLst/>
@@ -4569,7 +4570,7 @@
         <p:spPr>
           <a:xfrm>
             <a:off x="504000" y="1326600"/>
-            <a:ext cx="4426920" cy="1568520"/>
+            <a:ext cx="4426920" cy="1568160"/>
           </a:xfrm>
           <a:prstGeom prst="rect">
             <a:avLst/>
@@ -4599,7 +4600,7 @@
         <p:spPr>
           <a:xfrm>
             <a:off x="5152680" y="1326600"/>
-            <a:ext cx="4426920" cy="1568520"/>
+            <a:ext cx="4426920" cy="1568160"/>
           </a:xfrm>
           <a:prstGeom prst="rect">
             <a:avLst/>
@@ -4628,8 +4629,8 @@
         </p:nvSpPr>
         <p:spPr>
           <a:xfrm>
-            <a:off x="504000" y="3044520"/>
-            <a:ext cx="4426920" cy="1568520"/>
+            <a:off x="504000" y="3044160"/>
+            <a:ext cx="4426920" cy="1568160"/>
           </a:xfrm>
           <a:prstGeom prst="rect">
             <a:avLst/>
@@ -4658,8 +4659,8 @@
         </p:nvSpPr>
         <p:spPr>
           <a:xfrm>
-            <a:off x="5152680" y="3044520"/>
-            <a:ext cx="4426920" cy="1568520"/>
+            <a:off x="5152680" y="3044160"/>
+            <a:ext cx="4426920" cy="1568160"/>
           </a:xfrm>
           <a:prstGeom prst="rect">
             <a:avLst/>
@@ -4711,7 +4712,7 @@
         <p:spPr>
           <a:xfrm>
             <a:off x="504000" y="210600"/>
-            <a:ext cx="7019640" cy="946800"/>
+            <a:ext cx="7019280" cy="946800"/>
           </a:xfrm>
           <a:prstGeom prst="rect">
             <a:avLst/>
@@ -4742,7 +4743,7 @@
         <p:spPr>
           <a:xfrm>
             <a:off x="504000" y="1326600"/>
-            <a:ext cx="2921040" cy="1568520"/>
+            <a:ext cx="2920680" cy="1568160"/>
           </a:xfrm>
           <a:prstGeom prst="rect">
             <a:avLst/>
@@ -4771,8 +4772,8 @@
         </p:nvSpPr>
         <p:spPr>
           <a:xfrm>
-            <a:off x="3571560" y="1326600"/>
-            <a:ext cx="2921040" cy="1568520"/>
+            <a:off x="3571200" y="1326600"/>
+            <a:ext cx="2920680" cy="1568160"/>
           </a:xfrm>
           <a:prstGeom prst="rect">
             <a:avLst/>
@@ -4801,8 +4802,8 @@
         </p:nvSpPr>
         <p:spPr>
           <a:xfrm>
-            <a:off x="6639120" y="1326600"/>
-            <a:ext cx="2921040" cy="1568520"/>
+            <a:off x="6638040" y="1326600"/>
+            <a:ext cx="2920680" cy="1568160"/>
           </a:xfrm>
           <a:prstGeom prst="rect">
             <a:avLst/>
@@ -4831,8 +4832,8 @@
         </p:nvSpPr>
         <p:spPr>
           <a:xfrm>
-            <a:off x="504000" y="3044520"/>
-            <a:ext cx="2921040" cy="1568520"/>
+            <a:off x="504000" y="3044160"/>
+            <a:ext cx="2920680" cy="1568160"/>
           </a:xfrm>
           <a:prstGeom prst="rect">
             <a:avLst/>
@@ -4861,8 +4862,8 @@
         </p:nvSpPr>
         <p:spPr>
           <a:xfrm>
-            <a:off x="3571560" y="3044520"/>
-            <a:ext cx="2921040" cy="1568520"/>
+            <a:off x="3571200" y="3044160"/>
+            <a:ext cx="2920680" cy="1568160"/>
           </a:xfrm>
           <a:prstGeom prst="rect">
             <a:avLst/>
@@ -4891,24 +4892,46 @@
         </p:nvSpPr>
         <p:spPr>
           <a:xfrm>
-            <a:off x="6639120" y="3044520"/>
-            <a:ext cx="2921040" cy="1568520"/>
-          </a:xfrm>
-          <a:prstGeom prst="rect">
-            <a:avLst/>
-          </a:prstGeom>
-        </p:spPr>
-        <p:txBody>
-          <a:bodyPr lIns="0" rIns="0" tIns="0" bIns="0">
-            <a:normAutofit/>
-          </a:bodyPr>
-          <a:p>
-            <a:endParaRPr b="0" lang="en-US" sz="3200" spc="-1" strike="noStrike">
-              <a:latin typeface="Arial"/>
-            </a:endParaRPr>
-          </a:p>
-        </p:txBody>
-      </p:sp>
+            <a:off x="6638040" y="3044160"/>
+            <a:ext cx="2920680" cy="1568160"/>
+          </a:xfrm>
+          <a:prstGeom prst="rect">
+            <a:avLst/>
+          </a:prstGeom>
+        </p:spPr>
+        <p:txBody>
+          <a:bodyPr lIns="0" rIns="0" tIns="0" bIns="0">
+            <a:normAutofit/>
+          </a:bodyPr>
+          <a:p>
+            <a:endParaRPr b="0" lang="en-US" sz="3200" spc="-1" strike="noStrike">
+              <a:latin typeface="Arial"/>
+            </a:endParaRPr>
+          </a:p>
+        </p:txBody>
+      </p:sp>
+    </p:spTree>
+  </p:cSld>
+</p:sldLayout>
+</file>
+
+<file path=ppt/slideLayouts/slideLayout49.xml><?xml version="1.0" encoding="utf-8"?>
+<p:sldLayout xmlns:a="http://schemas.openxmlformats.org/drawingml/2006/main" xmlns:p="http://schemas.openxmlformats.org/presentationml/2006/main" xmlns:r="http://schemas.openxmlformats.org/officeDocument/2006/relationships" xmlns:p14="http://schemas.microsoft.com/office/powerpoint/2010/main" xmlns:p15="http://schemas.microsoft.com/office/powerpoint/2012/main" xmlns:mc="http://schemas.openxmlformats.org/markup-compatibility/2006" type="blank" preserve="1">
+  <p:cSld name="Blank Slide">
+    <p:spTree>
+      <p:nvGrpSpPr>
+        <p:cNvPr id="1" name=""/>
+        <p:cNvGrpSpPr/>
+        <p:nvPr/>
+      </p:nvGrpSpPr>
+      <p:grpSpPr>
+        <a:xfrm>
+          <a:off x="0" y="0"/>
+          <a:ext cx="0" cy="0"/>
+          <a:chOff x="0" y="0"/>
+          <a:chExt cx="0" cy="0"/>
+        </a:xfrm>
+      </p:grpSpPr>
     </p:spTree>
   </p:cSld>
 </p:sldLayout>
@@ -4944,7 +4967,7 @@
         <p:spPr>
           <a:xfrm>
             <a:off x="504000" y="210600"/>
-            <a:ext cx="7019640" cy="946800"/>
+            <a:ext cx="7019280" cy="946800"/>
           </a:xfrm>
           <a:prstGeom prst="rect">
             <a:avLst/>
@@ -4957,6 +4980,1107 @@
           <a:p>
             <a:pPr algn="ctr"/>
             <a:endParaRPr b="0" lang="en-US" sz="4400" spc="-1" strike="noStrike">
+              <a:latin typeface="Arial"/>
+            </a:endParaRPr>
+          </a:p>
+        </p:txBody>
+      </p:sp>
+    </p:spTree>
+  </p:cSld>
+</p:sldLayout>
+</file>
+
+<file path=ppt/slideLayouts/slideLayout50.xml><?xml version="1.0" encoding="utf-8"?>
+<p:sldLayout xmlns:a="http://schemas.openxmlformats.org/drawingml/2006/main" xmlns:p="http://schemas.openxmlformats.org/presentationml/2006/main" xmlns:r="http://schemas.openxmlformats.org/officeDocument/2006/relationships" xmlns:p14="http://schemas.microsoft.com/office/powerpoint/2010/main" xmlns:p15="http://schemas.microsoft.com/office/powerpoint/2012/main" xmlns:mc="http://schemas.openxmlformats.org/markup-compatibility/2006" type="tx" preserve="1">
+  <p:cSld name="Title Slide">
+    <p:spTree>
+      <p:nvGrpSpPr>
+        <p:cNvPr id="1" name=""/>
+        <p:cNvGrpSpPr/>
+        <p:nvPr/>
+      </p:nvGrpSpPr>
+      <p:grpSpPr>
+        <a:xfrm>
+          <a:off x="0" y="0"/>
+          <a:ext cx="0" cy="0"/>
+          <a:chOff x="0" y="0"/>
+          <a:chExt cx="0" cy="0"/>
+        </a:xfrm>
+      </p:grpSpPr>
+      <p:sp>
+        <p:nvSpPr>
+          <p:cNvPr id="159" name="PlaceHolder 1"/>
+          <p:cNvSpPr>
+            <a:spLocks noGrp="1"/>
+          </p:cNvSpPr>
+          <p:nvPr>
+            <p:ph type="title"/>
+          </p:nvPr>
+        </p:nvSpPr>
+        <p:spPr>
+          <a:xfrm>
+            <a:off x="504000" y="210600"/>
+            <a:ext cx="7019280" cy="946800"/>
+          </a:xfrm>
+          <a:prstGeom prst="rect">
+            <a:avLst/>
+          </a:prstGeom>
+        </p:spPr>
+        <p:txBody>
+          <a:bodyPr lIns="0" rIns="0" tIns="0" bIns="0" anchor="ctr">
+            <a:spAutoFit/>
+          </a:bodyPr>
+          <a:p>
+            <a:pPr algn="ctr"/>
+            <a:endParaRPr b="0" lang="en-US" sz="4400" spc="-1" strike="noStrike">
+              <a:latin typeface="Arial"/>
+            </a:endParaRPr>
+          </a:p>
+        </p:txBody>
+      </p:sp>
+      <p:sp>
+        <p:nvSpPr>
+          <p:cNvPr id="160" name="PlaceHolder 2"/>
+          <p:cNvSpPr>
+            <a:spLocks noGrp="1"/>
+          </p:cNvSpPr>
+          <p:nvPr>
+            <p:ph type="subTitle"/>
+          </p:nvPr>
+        </p:nvSpPr>
+        <p:spPr>
+          <a:xfrm>
+            <a:off x="504000" y="1326600"/>
+            <a:ext cx="9071640" cy="3288240"/>
+          </a:xfrm>
+          <a:prstGeom prst="rect">
+            <a:avLst/>
+          </a:prstGeom>
+        </p:spPr>
+        <p:txBody>
+          <a:bodyPr lIns="0" rIns="0" tIns="0" bIns="0" anchor="ctr">
+            <a:spAutoFit/>
+          </a:bodyPr>
+          <a:p>
+            <a:pPr algn="ctr"/>
+            <a:endParaRPr b="0" lang="en-US" sz="3200" spc="-1" strike="noStrike">
+              <a:latin typeface="Arial"/>
+            </a:endParaRPr>
+          </a:p>
+        </p:txBody>
+      </p:sp>
+    </p:spTree>
+  </p:cSld>
+</p:sldLayout>
+</file>
+
+<file path=ppt/slideLayouts/slideLayout51.xml><?xml version="1.0" encoding="utf-8"?>
+<p:sldLayout xmlns:a="http://schemas.openxmlformats.org/drawingml/2006/main" xmlns:p="http://schemas.openxmlformats.org/presentationml/2006/main" xmlns:r="http://schemas.openxmlformats.org/officeDocument/2006/relationships" xmlns:p14="http://schemas.microsoft.com/office/powerpoint/2010/main" xmlns:p15="http://schemas.microsoft.com/office/powerpoint/2012/main" xmlns:mc="http://schemas.openxmlformats.org/markup-compatibility/2006" type="obj" preserve="1">
+  <p:cSld name="Title, Content">
+    <p:spTree>
+      <p:nvGrpSpPr>
+        <p:cNvPr id="1" name=""/>
+        <p:cNvGrpSpPr/>
+        <p:nvPr/>
+      </p:nvGrpSpPr>
+      <p:grpSpPr>
+        <a:xfrm>
+          <a:off x="0" y="0"/>
+          <a:ext cx="0" cy="0"/>
+          <a:chOff x="0" y="0"/>
+          <a:chExt cx="0" cy="0"/>
+        </a:xfrm>
+      </p:grpSpPr>
+      <p:sp>
+        <p:nvSpPr>
+          <p:cNvPr id="161" name="PlaceHolder 1"/>
+          <p:cNvSpPr>
+            <a:spLocks noGrp="1"/>
+          </p:cNvSpPr>
+          <p:nvPr>
+            <p:ph type="title"/>
+          </p:nvPr>
+        </p:nvSpPr>
+        <p:spPr>
+          <a:xfrm>
+            <a:off x="504000" y="210600"/>
+            <a:ext cx="7019280" cy="946800"/>
+          </a:xfrm>
+          <a:prstGeom prst="rect">
+            <a:avLst/>
+          </a:prstGeom>
+        </p:spPr>
+        <p:txBody>
+          <a:bodyPr lIns="0" rIns="0" tIns="0" bIns="0" anchor="ctr">
+            <a:spAutoFit/>
+          </a:bodyPr>
+          <a:p>
+            <a:pPr algn="ctr"/>
+            <a:endParaRPr b="0" lang="en-US" sz="4400" spc="-1" strike="noStrike">
+              <a:latin typeface="Arial"/>
+            </a:endParaRPr>
+          </a:p>
+        </p:txBody>
+      </p:sp>
+      <p:sp>
+        <p:nvSpPr>
+          <p:cNvPr id="162" name="PlaceHolder 2"/>
+          <p:cNvSpPr>
+            <a:spLocks noGrp="1"/>
+          </p:cNvSpPr>
+          <p:nvPr>
+            <p:ph type="body"/>
+          </p:nvPr>
+        </p:nvSpPr>
+        <p:spPr>
+          <a:xfrm>
+            <a:off x="504000" y="1326600"/>
+            <a:ext cx="9071640" cy="3288240"/>
+          </a:xfrm>
+          <a:prstGeom prst="rect">
+            <a:avLst/>
+          </a:prstGeom>
+        </p:spPr>
+        <p:txBody>
+          <a:bodyPr lIns="0" rIns="0" tIns="0" bIns="0">
+            <a:normAutofit/>
+          </a:bodyPr>
+          <a:p>
+            <a:endParaRPr b="0" lang="en-US" sz="3200" spc="-1" strike="noStrike">
+              <a:latin typeface="Arial"/>
+            </a:endParaRPr>
+          </a:p>
+        </p:txBody>
+      </p:sp>
+    </p:spTree>
+  </p:cSld>
+</p:sldLayout>
+</file>
+
+<file path=ppt/slideLayouts/slideLayout52.xml><?xml version="1.0" encoding="utf-8"?>
+<p:sldLayout xmlns:a="http://schemas.openxmlformats.org/drawingml/2006/main" xmlns:p="http://schemas.openxmlformats.org/presentationml/2006/main" xmlns:r="http://schemas.openxmlformats.org/officeDocument/2006/relationships" xmlns:p14="http://schemas.microsoft.com/office/powerpoint/2010/main" xmlns:p15="http://schemas.microsoft.com/office/powerpoint/2012/main" xmlns:mc="http://schemas.openxmlformats.org/markup-compatibility/2006" type="twoObj" preserve="1">
+  <p:cSld name="Title, 2 Content">
+    <p:spTree>
+      <p:nvGrpSpPr>
+        <p:cNvPr id="1" name=""/>
+        <p:cNvGrpSpPr/>
+        <p:nvPr/>
+      </p:nvGrpSpPr>
+      <p:grpSpPr>
+        <a:xfrm>
+          <a:off x="0" y="0"/>
+          <a:ext cx="0" cy="0"/>
+          <a:chOff x="0" y="0"/>
+          <a:chExt cx="0" cy="0"/>
+        </a:xfrm>
+      </p:grpSpPr>
+      <p:sp>
+        <p:nvSpPr>
+          <p:cNvPr id="163" name="PlaceHolder 1"/>
+          <p:cNvSpPr>
+            <a:spLocks noGrp="1"/>
+          </p:cNvSpPr>
+          <p:nvPr>
+            <p:ph type="title"/>
+          </p:nvPr>
+        </p:nvSpPr>
+        <p:spPr>
+          <a:xfrm>
+            <a:off x="504000" y="210600"/>
+            <a:ext cx="7019280" cy="946800"/>
+          </a:xfrm>
+          <a:prstGeom prst="rect">
+            <a:avLst/>
+          </a:prstGeom>
+        </p:spPr>
+        <p:txBody>
+          <a:bodyPr lIns="0" rIns="0" tIns="0" bIns="0" anchor="ctr">
+            <a:spAutoFit/>
+          </a:bodyPr>
+          <a:p>
+            <a:pPr algn="ctr"/>
+            <a:endParaRPr b="0" lang="en-US" sz="4400" spc="-1" strike="noStrike">
+              <a:latin typeface="Arial"/>
+            </a:endParaRPr>
+          </a:p>
+        </p:txBody>
+      </p:sp>
+      <p:sp>
+        <p:nvSpPr>
+          <p:cNvPr id="164" name="PlaceHolder 2"/>
+          <p:cNvSpPr>
+            <a:spLocks noGrp="1"/>
+          </p:cNvSpPr>
+          <p:nvPr>
+            <p:ph type="body"/>
+          </p:nvPr>
+        </p:nvSpPr>
+        <p:spPr>
+          <a:xfrm>
+            <a:off x="504000" y="1326600"/>
+            <a:ext cx="4426920" cy="3288240"/>
+          </a:xfrm>
+          <a:prstGeom prst="rect">
+            <a:avLst/>
+          </a:prstGeom>
+        </p:spPr>
+        <p:txBody>
+          <a:bodyPr lIns="0" rIns="0" tIns="0" bIns="0">
+            <a:normAutofit/>
+          </a:bodyPr>
+          <a:p>
+            <a:endParaRPr b="0" lang="en-US" sz="3200" spc="-1" strike="noStrike">
+              <a:latin typeface="Arial"/>
+            </a:endParaRPr>
+          </a:p>
+        </p:txBody>
+      </p:sp>
+      <p:sp>
+        <p:nvSpPr>
+          <p:cNvPr id="165" name="PlaceHolder 3"/>
+          <p:cNvSpPr>
+            <a:spLocks noGrp="1"/>
+          </p:cNvSpPr>
+          <p:nvPr>
+            <p:ph type="body"/>
+          </p:nvPr>
+        </p:nvSpPr>
+        <p:spPr>
+          <a:xfrm>
+            <a:off x="5152680" y="1326600"/>
+            <a:ext cx="4426920" cy="3288240"/>
+          </a:xfrm>
+          <a:prstGeom prst="rect">
+            <a:avLst/>
+          </a:prstGeom>
+        </p:spPr>
+        <p:txBody>
+          <a:bodyPr lIns="0" rIns="0" tIns="0" bIns="0">
+            <a:normAutofit/>
+          </a:bodyPr>
+          <a:p>
+            <a:endParaRPr b="0" lang="en-US" sz="3200" spc="-1" strike="noStrike">
+              <a:latin typeface="Arial"/>
+            </a:endParaRPr>
+          </a:p>
+        </p:txBody>
+      </p:sp>
+    </p:spTree>
+  </p:cSld>
+</p:sldLayout>
+</file>
+
+<file path=ppt/slideLayouts/slideLayout53.xml><?xml version="1.0" encoding="utf-8"?>
+<p:sldLayout xmlns:a="http://schemas.openxmlformats.org/drawingml/2006/main" xmlns:p="http://schemas.openxmlformats.org/presentationml/2006/main" xmlns:r="http://schemas.openxmlformats.org/officeDocument/2006/relationships" xmlns:p14="http://schemas.microsoft.com/office/powerpoint/2010/main" xmlns:p15="http://schemas.microsoft.com/office/powerpoint/2012/main" xmlns:mc="http://schemas.openxmlformats.org/markup-compatibility/2006" type="titleOnly" preserve="1">
+  <p:cSld name="Title Only">
+    <p:spTree>
+      <p:nvGrpSpPr>
+        <p:cNvPr id="1" name=""/>
+        <p:cNvGrpSpPr/>
+        <p:nvPr/>
+      </p:nvGrpSpPr>
+      <p:grpSpPr>
+        <a:xfrm>
+          <a:off x="0" y="0"/>
+          <a:ext cx="0" cy="0"/>
+          <a:chOff x="0" y="0"/>
+          <a:chExt cx="0" cy="0"/>
+        </a:xfrm>
+      </p:grpSpPr>
+      <p:sp>
+        <p:nvSpPr>
+          <p:cNvPr id="166" name="PlaceHolder 1"/>
+          <p:cNvSpPr>
+            <a:spLocks noGrp="1"/>
+          </p:cNvSpPr>
+          <p:nvPr>
+            <p:ph type="title"/>
+          </p:nvPr>
+        </p:nvSpPr>
+        <p:spPr>
+          <a:xfrm>
+            <a:off x="504000" y="210600"/>
+            <a:ext cx="7019280" cy="946800"/>
+          </a:xfrm>
+          <a:prstGeom prst="rect">
+            <a:avLst/>
+          </a:prstGeom>
+        </p:spPr>
+        <p:txBody>
+          <a:bodyPr lIns="0" rIns="0" tIns="0" bIns="0" anchor="ctr">
+            <a:spAutoFit/>
+          </a:bodyPr>
+          <a:p>
+            <a:pPr algn="ctr"/>
+            <a:endParaRPr b="0" lang="en-US" sz="4400" spc="-1" strike="noStrike">
+              <a:latin typeface="Arial"/>
+            </a:endParaRPr>
+          </a:p>
+        </p:txBody>
+      </p:sp>
+    </p:spTree>
+  </p:cSld>
+</p:sldLayout>
+</file>
+
+<file path=ppt/slideLayouts/slideLayout54.xml><?xml version="1.0" encoding="utf-8"?>
+<p:sldLayout xmlns:a="http://schemas.openxmlformats.org/drawingml/2006/main" xmlns:p="http://schemas.openxmlformats.org/presentationml/2006/main" xmlns:r="http://schemas.openxmlformats.org/officeDocument/2006/relationships" xmlns:p14="http://schemas.microsoft.com/office/powerpoint/2010/main" xmlns:p15="http://schemas.microsoft.com/office/powerpoint/2012/main" xmlns:mc="http://schemas.openxmlformats.org/markup-compatibility/2006" type="objOnly" preserve="1">
+  <p:cSld name="Centered Text">
+    <p:spTree>
+      <p:nvGrpSpPr>
+        <p:cNvPr id="1" name=""/>
+        <p:cNvGrpSpPr/>
+        <p:nvPr/>
+      </p:nvGrpSpPr>
+      <p:grpSpPr>
+        <a:xfrm>
+          <a:off x="0" y="0"/>
+          <a:ext cx="0" cy="0"/>
+          <a:chOff x="0" y="0"/>
+          <a:chExt cx="0" cy="0"/>
+        </a:xfrm>
+      </p:grpSpPr>
+      <p:sp>
+        <p:nvSpPr>
+          <p:cNvPr id="167" name="PlaceHolder 1"/>
+          <p:cNvSpPr>
+            <a:spLocks noGrp="1"/>
+          </p:cNvSpPr>
+          <p:nvPr>
+            <p:ph type="subTitle"/>
+          </p:nvPr>
+        </p:nvSpPr>
+        <p:spPr>
+          <a:xfrm>
+            <a:off x="504000" y="210600"/>
+            <a:ext cx="7019280" cy="4390200"/>
+          </a:xfrm>
+          <a:prstGeom prst="rect">
+            <a:avLst/>
+          </a:prstGeom>
+        </p:spPr>
+        <p:txBody>
+          <a:bodyPr lIns="0" rIns="0" tIns="0" bIns="0" anchor="ctr">
+            <a:spAutoFit/>
+          </a:bodyPr>
+          <a:p>
+            <a:pPr algn="ctr"/>
+            <a:endParaRPr b="0" lang="en-US" sz="3200" spc="-1" strike="noStrike">
+              <a:latin typeface="Arial"/>
+            </a:endParaRPr>
+          </a:p>
+        </p:txBody>
+      </p:sp>
+    </p:spTree>
+  </p:cSld>
+</p:sldLayout>
+</file>
+
+<file path=ppt/slideLayouts/slideLayout55.xml><?xml version="1.0" encoding="utf-8"?>
+<p:sldLayout xmlns:a="http://schemas.openxmlformats.org/drawingml/2006/main" xmlns:p="http://schemas.openxmlformats.org/presentationml/2006/main" xmlns:r="http://schemas.openxmlformats.org/officeDocument/2006/relationships" xmlns:p14="http://schemas.microsoft.com/office/powerpoint/2010/main" xmlns:p15="http://schemas.microsoft.com/office/powerpoint/2012/main" xmlns:mc="http://schemas.openxmlformats.org/markup-compatibility/2006" type="twoObjAndObj" preserve="1">
+  <p:cSld name="Title, 2 Content and Content">
+    <p:spTree>
+      <p:nvGrpSpPr>
+        <p:cNvPr id="1" name=""/>
+        <p:cNvGrpSpPr/>
+        <p:nvPr/>
+      </p:nvGrpSpPr>
+      <p:grpSpPr>
+        <a:xfrm>
+          <a:off x="0" y="0"/>
+          <a:ext cx="0" cy="0"/>
+          <a:chOff x="0" y="0"/>
+          <a:chExt cx="0" cy="0"/>
+        </a:xfrm>
+      </p:grpSpPr>
+      <p:sp>
+        <p:nvSpPr>
+          <p:cNvPr id="168" name="PlaceHolder 1"/>
+          <p:cNvSpPr>
+            <a:spLocks noGrp="1"/>
+          </p:cNvSpPr>
+          <p:nvPr>
+            <p:ph type="title"/>
+          </p:nvPr>
+        </p:nvSpPr>
+        <p:spPr>
+          <a:xfrm>
+            <a:off x="504000" y="210600"/>
+            <a:ext cx="7019280" cy="946800"/>
+          </a:xfrm>
+          <a:prstGeom prst="rect">
+            <a:avLst/>
+          </a:prstGeom>
+        </p:spPr>
+        <p:txBody>
+          <a:bodyPr lIns="0" rIns="0" tIns="0" bIns="0" anchor="ctr">
+            <a:spAutoFit/>
+          </a:bodyPr>
+          <a:p>
+            <a:pPr algn="ctr"/>
+            <a:endParaRPr b="0" lang="en-US" sz="4400" spc="-1" strike="noStrike">
+              <a:latin typeface="Arial"/>
+            </a:endParaRPr>
+          </a:p>
+        </p:txBody>
+      </p:sp>
+      <p:sp>
+        <p:nvSpPr>
+          <p:cNvPr id="169" name="PlaceHolder 2"/>
+          <p:cNvSpPr>
+            <a:spLocks noGrp="1"/>
+          </p:cNvSpPr>
+          <p:nvPr>
+            <p:ph type="body"/>
+          </p:nvPr>
+        </p:nvSpPr>
+        <p:spPr>
+          <a:xfrm>
+            <a:off x="504000" y="1326600"/>
+            <a:ext cx="4426920" cy="1568160"/>
+          </a:xfrm>
+          <a:prstGeom prst="rect">
+            <a:avLst/>
+          </a:prstGeom>
+        </p:spPr>
+        <p:txBody>
+          <a:bodyPr lIns="0" rIns="0" tIns="0" bIns="0">
+            <a:normAutofit/>
+          </a:bodyPr>
+          <a:p>
+            <a:endParaRPr b="0" lang="en-US" sz="3200" spc="-1" strike="noStrike">
+              <a:latin typeface="Arial"/>
+            </a:endParaRPr>
+          </a:p>
+        </p:txBody>
+      </p:sp>
+      <p:sp>
+        <p:nvSpPr>
+          <p:cNvPr id="170" name="PlaceHolder 3"/>
+          <p:cNvSpPr>
+            <a:spLocks noGrp="1"/>
+          </p:cNvSpPr>
+          <p:nvPr>
+            <p:ph type="body"/>
+          </p:nvPr>
+        </p:nvSpPr>
+        <p:spPr>
+          <a:xfrm>
+            <a:off x="5152680" y="1326600"/>
+            <a:ext cx="4426920" cy="3288240"/>
+          </a:xfrm>
+          <a:prstGeom prst="rect">
+            <a:avLst/>
+          </a:prstGeom>
+        </p:spPr>
+        <p:txBody>
+          <a:bodyPr lIns="0" rIns="0" tIns="0" bIns="0">
+            <a:normAutofit/>
+          </a:bodyPr>
+          <a:p>
+            <a:endParaRPr b="0" lang="en-US" sz="3200" spc="-1" strike="noStrike">
+              <a:latin typeface="Arial"/>
+            </a:endParaRPr>
+          </a:p>
+        </p:txBody>
+      </p:sp>
+      <p:sp>
+        <p:nvSpPr>
+          <p:cNvPr id="171" name="PlaceHolder 4"/>
+          <p:cNvSpPr>
+            <a:spLocks noGrp="1"/>
+          </p:cNvSpPr>
+          <p:nvPr>
+            <p:ph type="body"/>
+          </p:nvPr>
+        </p:nvSpPr>
+        <p:spPr>
+          <a:xfrm>
+            <a:off x="504000" y="3044160"/>
+            <a:ext cx="4426920" cy="1568160"/>
+          </a:xfrm>
+          <a:prstGeom prst="rect">
+            <a:avLst/>
+          </a:prstGeom>
+        </p:spPr>
+        <p:txBody>
+          <a:bodyPr lIns="0" rIns="0" tIns="0" bIns="0">
+            <a:normAutofit/>
+          </a:bodyPr>
+          <a:p>
+            <a:endParaRPr b="0" lang="en-US" sz="3200" spc="-1" strike="noStrike">
+              <a:latin typeface="Arial"/>
+            </a:endParaRPr>
+          </a:p>
+        </p:txBody>
+      </p:sp>
+    </p:spTree>
+  </p:cSld>
+</p:sldLayout>
+</file>
+
+<file path=ppt/slideLayouts/slideLayout56.xml><?xml version="1.0" encoding="utf-8"?>
+<p:sldLayout xmlns:a="http://schemas.openxmlformats.org/drawingml/2006/main" xmlns:p="http://schemas.openxmlformats.org/presentationml/2006/main" xmlns:r="http://schemas.openxmlformats.org/officeDocument/2006/relationships" xmlns:p14="http://schemas.microsoft.com/office/powerpoint/2010/main" xmlns:p15="http://schemas.microsoft.com/office/powerpoint/2012/main" xmlns:mc="http://schemas.openxmlformats.org/markup-compatibility/2006" type="objAndTwoObj" preserve="1">
+  <p:cSld name="Title Content and 2 Content">
+    <p:spTree>
+      <p:nvGrpSpPr>
+        <p:cNvPr id="1" name=""/>
+        <p:cNvGrpSpPr/>
+        <p:nvPr/>
+      </p:nvGrpSpPr>
+      <p:grpSpPr>
+        <a:xfrm>
+          <a:off x="0" y="0"/>
+          <a:ext cx="0" cy="0"/>
+          <a:chOff x="0" y="0"/>
+          <a:chExt cx="0" cy="0"/>
+        </a:xfrm>
+      </p:grpSpPr>
+      <p:sp>
+        <p:nvSpPr>
+          <p:cNvPr id="172" name="PlaceHolder 1"/>
+          <p:cNvSpPr>
+            <a:spLocks noGrp="1"/>
+          </p:cNvSpPr>
+          <p:nvPr>
+            <p:ph type="title"/>
+          </p:nvPr>
+        </p:nvSpPr>
+        <p:spPr>
+          <a:xfrm>
+            <a:off x="504000" y="210600"/>
+            <a:ext cx="7019280" cy="946800"/>
+          </a:xfrm>
+          <a:prstGeom prst="rect">
+            <a:avLst/>
+          </a:prstGeom>
+        </p:spPr>
+        <p:txBody>
+          <a:bodyPr lIns="0" rIns="0" tIns="0" bIns="0" anchor="ctr">
+            <a:spAutoFit/>
+          </a:bodyPr>
+          <a:p>
+            <a:pPr algn="ctr"/>
+            <a:endParaRPr b="0" lang="en-US" sz="4400" spc="-1" strike="noStrike">
+              <a:latin typeface="Arial"/>
+            </a:endParaRPr>
+          </a:p>
+        </p:txBody>
+      </p:sp>
+      <p:sp>
+        <p:nvSpPr>
+          <p:cNvPr id="173" name="PlaceHolder 2"/>
+          <p:cNvSpPr>
+            <a:spLocks noGrp="1"/>
+          </p:cNvSpPr>
+          <p:nvPr>
+            <p:ph type="body"/>
+          </p:nvPr>
+        </p:nvSpPr>
+        <p:spPr>
+          <a:xfrm>
+            <a:off x="504000" y="1326600"/>
+            <a:ext cx="4426920" cy="3288240"/>
+          </a:xfrm>
+          <a:prstGeom prst="rect">
+            <a:avLst/>
+          </a:prstGeom>
+        </p:spPr>
+        <p:txBody>
+          <a:bodyPr lIns="0" rIns="0" tIns="0" bIns="0">
+            <a:normAutofit/>
+          </a:bodyPr>
+          <a:p>
+            <a:endParaRPr b="0" lang="en-US" sz="3200" spc="-1" strike="noStrike">
+              <a:latin typeface="Arial"/>
+            </a:endParaRPr>
+          </a:p>
+        </p:txBody>
+      </p:sp>
+      <p:sp>
+        <p:nvSpPr>
+          <p:cNvPr id="174" name="PlaceHolder 3"/>
+          <p:cNvSpPr>
+            <a:spLocks noGrp="1"/>
+          </p:cNvSpPr>
+          <p:nvPr>
+            <p:ph type="body"/>
+          </p:nvPr>
+        </p:nvSpPr>
+        <p:spPr>
+          <a:xfrm>
+            <a:off x="5152680" y="1326600"/>
+            <a:ext cx="4426920" cy="1568160"/>
+          </a:xfrm>
+          <a:prstGeom prst="rect">
+            <a:avLst/>
+          </a:prstGeom>
+        </p:spPr>
+        <p:txBody>
+          <a:bodyPr lIns="0" rIns="0" tIns="0" bIns="0">
+            <a:normAutofit/>
+          </a:bodyPr>
+          <a:p>
+            <a:endParaRPr b="0" lang="en-US" sz="3200" spc="-1" strike="noStrike">
+              <a:latin typeface="Arial"/>
+            </a:endParaRPr>
+          </a:p>
+        </p:txBody>
+      </p:sp>
+      <p:sp>
+        <p:nvSpPr>
+          <p:cNvPr id="175" name="PlaceHolder 4"/>
+          <p:cNvSpPr>
+            <a:spLocks noGrp="1"/>
+          </p:cNvSpPr>
+          <p:nvPr>
+            <p:ph type="body"/>
+          </p:nvPr>
+        </p:nvSpPr>
+        <p:spPr>
+          <a:xfrm>
+            <a:off x="5152680" y="3044160"/>
+            <a:ext cx="4426920" cy="1568160"/>
+          </a:xfrm>
+          <a:prstGeom prst="rect">
+            <a:avLst/>
+          </a:prstGeom>
+        </p:spPr>
+        <p:txBody>
+          <a:bodyPr lIns="0" rIns="0" tIns="0" bIns="0">
+            <a:normAutofit/>
+          </a:bodyPr>
+          <a:p>
+            <a:endParaRPr b="0" lang="en-US" sz="3200" spc="-1" strike="noStrike">
+              <a:latin typeface="Arial"/>
+            </a:endParaRPr>
+          </a:p>
+        </p:txBody>
+      </p:sp>
+    </p:spTree>
+  </p:cSld>
+</p:sldLayout>
+</file>
+
+<file path=ppt/slideLayouts/slideLayout57.xml><?xml version="1.0" encoding="utf-8"?>
+<p:sldLayout xmlns:a="http://schemas.openxmlformats.org/drawingml/2006/main" xmlns:p="http://schemas.openxmlformats.org/presentationml/2006/main" xmlns:r="http://schemas.openxmlformats.org/officeDocument/2006/relationships" xmlns:p14="http://schemas.microsoft.com/office/powerpoint/2010/main" xmlns:p15="http://schemas.microsoft.com/office/powerpoint/2012/main" xmlns:mc="http://schemas.openxmlformats.org/markup-compatibility/2006" type="twoObjOverTx" preserve="1">
+  <p:cSld name="Title, 2 Content over Content">
+    <p:spTree>
+      <p:nvGrpSpPr>
+        <p:cNvPr id="1" name=""/>
+        <p:cNvGrpSpPr/>
+        <p:nvPr/>
+      </p:nvGrpSpPr>
+      <p:grpSpPr>
+        <a:xfrm>
+          <a:off x="0" y="0"/>
+          <a:ext cx="0" cy="0"/>
+          <a:chOff x="0" y="0"/>
+          <a:chExt cx="0" cy="0"/>
+        </a:xfrm>
+      </p:grpSpPr>
+      <p:sp>
+        <p:nvSpPr>
+          <p:cNvPr id="176" name="PlaceHolder 1"/>
+          <p:cNvSpPr>
+            <a:spLocks noGrp="1"/>
+          </p:cNvSpPr>
+          <p:nvPr>
+            <p:ph type="title"/>
+          </p:nvPr>
+        </p:nvSpPr>
+        <p:spPr>
+          <a:xfrm>
+            <a:off x="504000" y="210600"/>
+            <a:ext cx="7019280" cy="946800"/>
+          </a:xfrm>
+          <a:prstGeom prst="rect">
+            <a:avLst/>
+          </a:prstGeom>
+        </p:spPr>
+        <p:txBody>
+          <a:bodyPr lIns="0" rIns="0" tIns="0" bIns="0" anchor="ctr">
+            <a:spAutoFit/>
+          </a:bodyPr>
+          <a:p>
+            <a:pPr algn="ctr"/>
+            <a:endParaRPr b="0" lang="en-US" sz="4400" spc="-1" strike="noStrike">
+              <a:latin typeface="Arial"/>
+            </a:endParaRPr>
+          </a:p>
+        </p:txBody>
+      </p:sp>
+      <p:sp>
+        <p:nvSpPr>
+          <p:cNvPr id="177" name="PlaceHolder 2"/>
+          <p:cNvSpPr>
+            <a:spLocks noGrp="1"/>
+          </p:cNvSpPr>
+          <p:nvPr>
+            <p:ph type="body"/>
+          </p:nvPr>
+        </p:nvSpPr>
+        <p:spPr>
+          <a:xfrm>
+            <a:off x="504000" y="1326600"/>
+            <a:ext cx="4426920" cy="1568160"/>
+          </a:xfrm>
+          <a:prstGeom prst="rect">
+            <a:avLst/>
+          </a:prstGeom>
+        </p:spPr>
+        <p:txBody>
+          <a:bodyPr lIns="0" rIns="0" tIns="0" bIns="0">
+            <a:normAutofit/>
+          </a:bodyPr>
+          <a:p>
+            <a:endParaRPr b="0" lang="en-US" sz="3200" spc="-1" strike="noStrike">
+              <a:latin typeface="Arial"/>
+            </a:endParaRPr>
+          </a:p>
+        </p:txBody>
+      </p:sp>
+      <p:sp>
+        <p:nvSpPr>
+          <p:cNvPr id="178" name="PlaceHolder 3"/>
+          <p:cNvSpPr>
+            <a:spLocks noGrp="1"/>
+          </p:cNvSpPr>
+          <p:nvPr>
+            <p:ph type="body"/>
+          </p:nvPr>
+        </p:nvSpPr>
+        <p:spPr>
+          <a:xfrm>
+            <a:off x="5152680" y="1326600"/>
+            <a:ext cx="4426920" cy="1568160"/>
+          </a:xfrm>
+          <a:prstGeom prst="rect">
+            <a:avLst/>
+          </a:prstGeom>
+        </p:spPr>
+        <p:txBody>
+          <a:bodyPr lIns="0" rIns="0" tIns="0" bIns="0">
+            <a:normAutofit/>
+          </a:bodyPr>
+          <a:p>
+            <a:endParaRPr b="0" lang="en-US" sz="3200" spc="-1" strike="noStrike">
+              <a:latin typeface="Arial"/>
+            </a:endParaRPr>
+          </a:p>
+        </p:txBody>
+      </p:sp>
+      <p:sp>
+        <p:nvSpPr>
+          <p:cNvPr id="179" name="PlaceHolder 4"/>
+          <p:cNvSpPr>
+            <a:spLocks noGrp="1"/>
+          </p:cNvSpPr>
+          <p:nvPr>
+            <p:ph type="body"/>
+          </p:nvPr>
+        </p:nvSpPr>
+        <p:spPr>
+          <a:xfrm>
+            <a:off x="504000" y="3044160"/>
+            <a:ext cx="9071640" cy="1568160"/>
+          </a:xfrm>
+          <a:prstGeom prst="rect">
+            <a:avLst/>
+          </a:prstGeom>
+        </p:spPr>
+        <p:txBody>
+          <a:bodyPr lIns="0" rIns="0" tIns="0" bIns="0">
+            <a:normAutofit/>
+          </a:bodyPr>
+          <a:p>
+            <a:endParaRPr b="0" lang="en-US" sz="3200" spc="-1" strike="noStrike">
+              <a:latin typeface="Arial"/>
+            </a:endParaRPr>
+          </a:p>
+        </p:txBody>
+      </p:sp>
+    </p:spTree>
+  </p:cSld>
+</p:sldLayout>
+</file>
+
+<file path=ppt/slideLayouts/slideLayout58.xml><?xml version="1.0" encoding="utf-8"?>
+<p:sldLayout xmlns:a="http://schemas.openxmlformats.org/drawingml/2006/main" xmlns:p="http://schemas.openxmlformats.org/presentationml/2006/main" xmlns:r="http://schemas.openxmlformats.org/officeDocument/2006/relationships" xmlns:p14="http://schemas.microsoft.com/office/powerpoint/2010/main" xmlns:p15="http://schemas.microsoft.com/office/powerpoint/2012/main" xmlns:mc="http://schemas.openxmlformats.org/markup-compatibility/2006" type="objOverTx" preserve="1">
+  <p:cSld name="Title, Content over Content">
+    <p:spTree>
+      <p:nvGrpSpPr>
+        <p:cNvPr id="1" name=""/>
+        <p:cNvGrpSpPr/>
+        <p:nvPr/>
+      </p:nvGrpSpPr>
+      <p:grpSpPr>
+        <a:xfrm>
+          <a:off x="0" y="0"/>
+          <a:ext cx="0" cy="0"/>
+          <a:chOff x="0" y="0"/>
+          <a:chExt cx="0" cy="0"/>
+        </a:xfrm>
+      </p:grpSpPr>
+      <p:sp>
+        <p:nvSpPr>
+          <p:cNvPr id="180" name="PlaceHolder 1"/>
+          <p:cNvSpPr>
+            <a:spLocks noGrp="1"/>
+          </p:cNvSpPr>
+          <p:nvPr>
+            <p:ph type="title"/>
+          </p:nvPr>
+        </p:nvSpPr>
+        <p:spPr>
+          <a:xfrm>
+            <a:off x="504000" y="210600"/>
+            <a:ext cx="7019280" cy="946800"/>
+          </a:xfrm>
+          <a:prstGeom prst="rect">
+            <a:avLst/>
+          </a:prstGeom>
+        </p:spPr>
+        <p:txBody>
+          <a:bodyPr lIns="0" rIns="0" tIns="0" bIns="0" anchor="ctr">
+            <a:spAutoFit/>
+          </a:bodyPr>
+          <a:p>
+            <a:pPr algn="ctr"/>
+            <a:endParaRPr b="0" lang="en-US" sz="4400" spc="-1" strike="noStrike">
+              <a:latin typeface="Arial"/>
+            </a:endParaRPr>
+          </a:p>
+        </p:txBody>
+      </p:sp>
+      <p:sp>
+        <p:nvSpPr>
+          <p:cNvPr id="181" name="PlaceHolder 2"/>
+          <p:cNvSpPr>
+            <a:spLocks noGrp="1"/>
+          </p:cNvSpPr>
+          <p:nvPr>
+            <p:ph type="body"/>
+          </p:nvPr>
+        </p:nvSpPr>
+        <p:spPr>
+          <a:xfrm>
+            <a:off x="504000" y="1326600"/>
+            <a:ext cx="9071640" cy="1568160"/>
+          </a:xfrm>
+          <a:prstGeom prst="rect">
+            <a:avLst/>
+          </a:prstGeom>
+        </p:spPr>
+        <p:txBody>
+          <a:bodyPr lIns="0" rIns="0" tIns="0" bIns="0">
+            <a:normAutofit/>
+          </a:bodyPr>
+          <a:p>
+            <a:endParaRPr b="0" lang="en-US" sz="3200" spc="-1" strike="noStrike">
+              <a:latin typeface="Arial"/>
+            </a:endParaRPr>
+          </a:p>
+        </p:txBody>
+      </p:sp>
+      <p:sp>
+        <p:nvSpPr>
+          <p:cNvPr id="182" name="PlaceHolder 3"/>
+          <p:cNvSpPr>
+            <a:spLocks noGrp="1"/>
+          </p:cNvSpPr>
+          <p:nvPr>
+            <p:ph type="body"/>
+          </p:nvPr>
+        </p:nvSpPr>
+        <p:spPr>
+          <a:xfrm>
+            <a:off x="504000" y="3044160"/>
+            <a:ext cx="9071640" cy="1568160"/>
+          </a:xfrm>
+          <a:prstGeom prst="rect">
+            <a:avLst/>
+          </a:prstGeom>
+        </p:spPr>
+        <p:txBody>
+          <a:bodyPr lIns="0" rIns="0" tIns="0" bIns="0">
+            <a:normAutofit/>
+          </a:bodyPr>
+          <a:p>
+            <a:endParaRPr b="0" lang="en-US" sz="3200" spc="-1" strike="noStrike">
+              <a:latin typeface="Arial"/>
+            </a:endParaRPr>
+          </a:p>
+        </p:txBody>
+      </p:sp>
+    </p:spTree>
+  </p:cSld>
+</p:sldLayout>
+</file>
+
+<file path=ppt/slideLayouts/slideLayout59.xml><?xml version="1.0" encoding="utf-8"?>
+<p:sldLayout xmlns:a="http://schemas.openxmlformats.org/drawingml/2006/main" xmlns:p="http://schemas.openxmlformats.org/presentationml/2006/main" xmlns:r="http://schemas.openxmlformats.org/officeDocument/2006/relationships" xmlns:p14="http://schemas.microsoft.com/office/powerpoint/2010/main" xmlns:p15="http://schemas.microsoft.com/office/powerpoint/2012/main" xmlns:mc="http://schemas.openxmlformats.org/markup-compatibility/2006" type="fourObj" preserve="1">
+  <p:cSld name="Title, 4 Content">
+    <p:spTree>
+      <p:nvGrpSpPr>
+        <p:cNvPr id="1" name=""/>
+        <p:cNvGrpSpPr/>
+        <p:nvPr/>
+      </p:nvGrpSpPr>
+      <p:grpSpPr>
+        <a:xfrm>
+          <a:off x="0" y="0"/>
+          <a:ext cx="0" cy="0"/>
+          <a:chOff x="0" y="0"/>
+          <a:chExt cx="0" cy="0"/>
+        </a:xfrm>
+      </p:grpSpPr>
+      <p:sp>
+        <p:nvSpPr>
+          <p:cNvPr id="183" name="PlaceHolder 1"/>
+          <p:cNvSpPr>
+            <a:spLocks noGrp="1"/>
+          </p:cNvSpPr>
+          <p:nvPr>
+            <p:ph type="title"/>
+          </p:nvPr>
+        </p:nvSpPr>
+        <p:spPr>
+          <a:xfrm>
+            <a:off x="504000" y="210600"/>
+            <a:ext cx="7019280" cy="946800"/>
+          </a:xfrm>
+          <a:prstGeom prst="rect">
+            <a:avLst/>
+          </a:prstGeom>
+        </p:spPr>
+        <p:txBody>
+          <a:bodyPr lIns="0" rIns="0" tIns="0" bIns="0" anchor="ctr">
+            <a:spAutoFit/>
+          </a:bodyPr>
+          <a:p>
+            <a:pPr algn="ctr"/>
+            <a:endParaRPr b="0" lang="en-US" sz="4400" spc="-1" strike="noStrike">
+              <a:latin typeface="Arial"/>
+            </a:endParaRPr>
+          </a:p>
+        </p:txBody>
+      </p:sp>
+      <p:sp>
+        <p:nvSpPr>
+          <p:cNvPr id="184" name="PlaceHolder 2"/>
+          <p:cNvSpPr>
+            <a:spLocks noGrp="1"/>
+          </p:cNvSpPr>
+          <p:nvPr>
+            <p:ph type="body"/>
+          </p:nvPr>
+        </p:nvSpPr>
+        <p:spPr>
+          <a:xfrm>
+            <a:off x="504000" y="1326600"/>
+            <a:ext cx="4426920" cy="1568160"/>
+          </a:xfrm>
+          <a:prstGeom prst="rect">
+            <a:avLst/>
+          </a:prstGeom>
+        </p:spPr>
+        <p:txBody>
+          <a:bodyPr lIns="0" rIns="0" tIns="0" bIns="0">
+            <a:normAutofit/>
+          </a:bodyPr>
+          <a:p>
+            <a:endParaRPr b="0" lang="en-US" sz="3200" spc="-1" strike="noStrike">
+              <a:latin typeface="Arial"/>
+            </a:endParaRPr>
+          </a:p>
+        </p:txBody>
+      </p:sp>
+      <p:sp>
+        <p:nvSpPr>
+          <p:cNvPr id="185" name="PlaceHolder 3"/>
+          <p:cNvSpPr>
+            <a:spLocks noGrp="1"/>
+          </p:cNvSpPr>
+          <p:nvPr>
+            <p:ph type="body"/>
+          </p:nvPr>
+        </p:nvSpPr>
+        <p:spPr>
+          <a:xfrm>
+            <a:off x="5152680" y="1326600"/>
+            <a:ext cx="4426920" cy="1568160"/>
+          </a:xfrm>
+          <a:prstGeom prst="rect">
+            <a:avLst/>
+          </a:prstGeom>
+        </p:spPr>
+        <p:txBody>
+          <a:bodyPr lIns="0" rIns="0" tIns="0" bIns="0">
+            <a:normAutofit/>
+          </a:bodyPr>
+          <a:p>
+            <a:endParaRPr b="0" lang="en-US" sz="3200" spc="-1" strike="noStrike">
+              <a:latin typeface="Arial"/>
+            </a:endParaRPr>
+          </a:p>
+        </p:txBody>
+      </p:sp>
+      <p:sp>
+        <p:nvSpPr>
+          <p:cNvPr id="186" name="PlaceHolder 4"/>
+          <p:cNvSpPr>
+            <a:spLocks noGrp="1"/>
+          </p:cNvSpPr>
+          <p:nvPr>
+            <p:ph type="body"/>
+          </p:nvPr>
+        </p:nvSpPr>
+        <p:spPr>
+          <a:xfrm>
+            <a:off x="504000" y="3044160"/>
+            <a:ext cx="4426920" cy="1568160"/>
+          </a:xfrm>
+          <a:prstGeom prst="rect">
+            <a:avLst/>
+          </a:prstGeom>
+        </p:spPr>
+        <p:txBody>
+          <a:bodyPr lIns="0" rIns="0" tIns="0" bIns="0">
+            <a:normAutofit/>
+          </a:bodyPr>
+          <a:p>
+            <a:endParaRPr b="0" lang="en-US" sz="3200" spc="-1" strike="noStrike">
+              <a:latin typeface="Arial"/>
+            </a:endParaRPr>
+          </a:p>
+        </p:txBody>
+      </p:sp>
+      <p:sp>
+        <p:nvSpPr>
+          <p:cNvPr id="187" name="PlaceHolder 5"/>
+          <p:cNvSpPr>
+            <a:spLocks noGrp="1"/>
+          </p:cNvSpPr>
+          <p:nvPr>
+            <p:ph type="body"/>
+          </p:nvPr>
+        </p:nvSpPr>
+        <p:spPr>
+          <a:xfrm>
+            <a:off x="5152680" y="3044160"/>
+            <a:ext cx="4426920" cy="1568160"/>
+          </a:xfrm>
+          <a:prstGeom prst="rect">
+            <a:avLst/>
+          </a:prstGeom>
+        </p:spPr>
+        <p:txBody>
+          <a:bodyPr lIns="0" rIns="0" tIns="0" bIns="0">
+            <a:normAutofit/>
+          </a:bodyPr>
+          <a:p>
+            <a:endParaRPr b="0" lang="en-US" sz="3200" spc="-1" strike="noStrike">
               <a:latin typeface="Arial"/>
             </a:endParaRPr>
           </a:p>
@@ -4997,7 +6121,7 @@
         <p:spPr>
           <a:xfrm>
             <a:off x="504000" y="210600"/>
-            <a:ext cx="7019640" cy="4390200"/>
+            <a:ext cx="7019280" cy="4390200"/>
           </a:xfrm>
           <a:prstGeom prst="rect">
             <a:avLst/>
@@ -5009,6 +6133,239 @@
           </a:bodyPr>
           <a:p>
             <a:pPr algn="ctr"/>
+            <a:endParaRPr b="0" lang="en-US" sz="3200" spc="-1" strike="noStrike">
+              <a:latin typeface="Arial"/>
+            </a:endParaRPr>
+          </a:p>
+        </p:txBody>
+      </p:sp>
+    </p:spTree>
+  </p:cSld>
+</p:sldLayout>
+</file>
+
+<file path=ppt/slideLayouts/slideLayout60.xml><?xml version="1.0" encoding="utf-8"?>
+<p:sldLayout xmlns:a="http://schemas.openxmlformats.org/drawingml/2006/main" xmlns:p="http://schemas.openxmlformats.org/presentationml/2006/main" xmlns:r="http://schemas.openxmlformats.org/officeDocument/2006/relationships" xmlns:p14="http://schemas.microsoft.com/office/powerpoint/2010/main" xmlns:p15="http://schemas.microsoft.com/office/powerpoint/2012/main" xmlns:mc="http://schemas.openxmlformats.org/markup-compatibility/2006" type="blank" preserve="1">
+  <p:cSld name="Title, 6 Content">
+    <p:spTree>
+      <p:nvGrpSpPr>
+        <p:cNvPr id="1" name=""/>
+        <p:cNvGrpSpPr/>
+        <p:nvPr/>
+      </p:nvGrpSpPr>
+      <p:grpSpPr>
+        <a:xfrm>
+          <a:off x="0" y="0"/>
+          <a:ext cx="0" cy="0"/>
+          <a:chOff x="0" y="0"/>
+          <a:chExt cx="0" cy="0"/>
+        </a:xfrm>
+      </p:grpSpPr>
+      <p:sp>
+        <p:nvSpPr>
+          <p:cNvPr id="188" name="PlaceHolder 1"/>
+          <p:cNvSpPr>
+            <a:spLocks noGrp="1"/>
+          </p:cNvSpPr>
+          <p:nvPr>
+            <p:ph type="title"/>
+          </p:nvPr>
+        </p:nvSpPr>
+        <p:spPr>
+          <a:xfrm>
+            <a:off x="504000" y="210600"/>
+            <a:ext cx="7019280" cy="946800"/>
+          </a:xfrm>
+          <a:prstGeom prst="rect">
+            <a:avLst/>
+          </a:prstGeom>
+        </p:spPr>
+        <p:txBody>
+          <a:bodyPr lIns="0" rIns="0" tIns="0" bIns="0" anchor="ctr">
+            <a:spAutoFit/>
+          </a:bodyPr>
+          <a:p>
+            <a:pPr algn="ctr"/>
+            <a:endParaRPr b="0" lang="en-US" sz="4400" spc="-1" strike="noStrike">
+              <a:latin typeface="Arial"/>
+            </a:endParaRPr>
+          </a:p>
+        </p:txBody>
+      </p:sp>
+      <p:sp>
+        <p:nvSpPr>
+          <p:cNvPr id="189" name="PlaceHolder 2"/>
+          <p:cNvSpPr>
+            <a:spLocks noGrp="1"/>
+          </p:cNvSpPr>
+          <p:nvPr>
+            <p:ph type="body"/>
+          </p:nvPr>
+        </p:nvSpPr>
+        <p:spPr>
+          <a:xfrm>
+            <a:off x="504000" y="1326600"/>
+            <a:ext cx="2920680" cy="1568160"/>
+          </a:xfrm>
+          <a:prstGeom prst="rect">
+            <a:avLst/>
+          </a:prstGeom>
+        </p:spPr>
+        <p:txBody>
+          <a:bodyPr lIns="0" rIns="0" tIns="0" bIns="0">
+            <a:normAutofit/>
+          </a:bodyPr>
+          <a:p>
+            <a:endParaRPr b="0" lang="en-US" sz="3200" spc="-1" strike="noStrike">
+              <a:latin typeface="Arial"/>
+            </a:endParaRPr>
+          </a:p>
+        </p:txBody>
+      </p:sp>
+      <p:sp>
+        <p:nvSpPr>
+          <p:cNvPr id="190" name="PlaceHolder 3"/>
+          <p:cNvSpPr>
+            <a:spLocks noGrp="1"/>
+          </p:cNvSpPr>
+          <p:nvPr>
+            <p:ph type="body"/>
+          </p:nvPr>
+        </p:nvSpPr>
+        <p:spPr>
+          <a:xfrm>
+            <a:off x="3571200" y="1326600"/>
+            <a:ext cx="2920680" cy="1568160"/>
+          </a:xfrm>
+          <a:prstGeom prst="rect">
+            <a:avLst/>
+          </a:prstGeom>
+        </p:spPr>
+        <p:txBody>
+          <a:bodyPr lIns="0" rIns="0" tIns="0" bIns="0">
+            <a:normAutofit/>
+          </a:bodyPr>
+          <a:p>
+            <a:endParaRPr b="0" lang="en-US" sz="3200" spc="-1" strike="noStrike">
+              <a:latin typeface="Arial"/>
+            </a:endParaRPr>
+          </a:p>
+        </p:txBody>
+      </p:sp>
+      <p:sp>
+        <p:nvSpPr>
+          <p:cNvPr id="191" name="PlaceHolder 4"/>
+          <p:cNvSpPr>
+            <a:spLocks noGrp="1"/>
+          </p:cNvSpPr>
+          <p:nvPr>
+            <p:ph type="body"/>
+          </p:nvPr>
+        </p:nvSpPr>
+        <p:spPr>
+          <a:xfrm>
+            <a:off x="6638040" y="1326600"/>
+            <a:ext cx="2920680" cy="1568160"/>
+          </a:xfrm>
+          <a:prstGeom prst="rect">
+            <a:avLst/>
+          </a:prstGeom>
+        </p:spPr>
+        <p:txBody>
+          <a:bodyPr lIns="0" rIns="0" tIns="0" bIns="0">
+            <a:normAutofit/>
+          </a:bodyPr>
+          <a:p>
+            <a:endParaRPr b="0" lang="en-US" sz="3200" spc="-1" strike="noStrike">
+              <a:latin typeface="Arial"/>
+            </a:endParaRPr>
+          </a:p>
+        </p:txBody>
+      </p:sp>
+      <p:sp>
+        <p:nvSpPr>
+          <p:cNvPr id="192" name="PlaceHolder 5"/>
+          <p:cNvSpPr>
+            <a:spLocks noGrp="1"/>
+          </p:cNvSpPr>
+          <p:nvPr>
+            <p:ph type="body"/>
+          </p:nvPr>
+        </p:nvSpPr>
+        <p:spPr>
+          <a:xfrm>
+            <a:off x="504000" y="3044160"/>
+            <a:ext cx="2920680" cy="1568160"/>
+          </a:xfrm>
+          <a:prstGeom prst="rect">
+            <a:avLst/>
+          </a:prstGeom>
+        </p:spPr>
+        <p:txBody>
+          <a:bodyPr lIns="0" rIns="0" tIns="0" bIns="0">
+            <a:normAutofit/>
+          </a:bodyPr>
+          <a:p>
+            <a:endParaRPr b="0" lang="en-US" sz="3200" spc="-1" strike="noStrike">
+              <a:latin typeface="Arial"/>
+            </a:endParaRPr>
+          </a:p>
+        </p:txBody>
+      </p:sp>
+      <p:sp>
+        <p:nvSpPr>
+          <p:cNvPr id="193" name="PlaceHolder 6"/>
+          <p:cNvSpPr>
+            <a:spLocks noGrp="1"/>
+          </p:cNvSpPr>
+          <p:nvPr>
+            <p:ph type="body"/>
+          </p:nvPr>
+        </p:nvSpPr>
+        <p:spPr>
+          <a:xfrm>
+            <a:off x="3571200" y="3044160"/>
+            <a:ext cx="2920680" cy="1568160"/>
+          </a:xfrm>
+          <a:prstGeom prst="rect">
+            <a:avLst/>
+          </a:prstGeom>
+        </p:spPr>
+        <p:txBody>
+          <a:bodyPr lIns="0" rIns="0" tIns="0" bIns="0">
+            <a:normAutofit/>
+          </a:bodyPr>
+          <a:p>
+            <a:endParaRPr b="0" lang="en-US" sz="3200" spc="-1" strike="noStrike">
+              <a:latin typeface="Arial"/>
+            </a:endParaRPr>
+          </a:p>
+        </p:txBody>
+      </p:sp>
+      <p:sp>
+        <p:nvSpPr>
+          <p:cNvPr id="194" name="PlaceHolder 7"/>
+          <p:cNvSpPr>
+            <a:spLocks noGrp="1"/>
+          </p:cNvSpPr>
+          <p:nvPr>
+            <p:ph type="body"/>
+          </p:nvPr>
+        </p:nvSpPr>
+        <p:spPr>
+          <a:xfrm>
+            <a:off x="6638040" y="3044160"/>
+            <a:ext cx="2920680" cy="1568160"/>
+          </a:xfrm>
+          <a:prstGeom prst="rect">
+            <a:avLst/>
+          </a:prstGeom>
+        </p:spPr>
+        <p:txBody>
+          <a:bodyPr lIns="0" rIns="0" tIns="0" bIns="0">
+            <a:normAutofit/>
+          </a:bodyPr>
+          <a:p>
             <a:endParaRPr b="0" lang="en-US" sz="3200" spc="-1" strike="noStrike">
               <a:latin typeface="Arial"/>
             </a:endParaRPr>
@@ -5050,7 +6407,7 @@
         <p:spPr>
           <a:xfrm>
             <a:off x="504000" y="210600"/>
-            <a:ext cx="7019640" cy="946800"/>
+            <a:ext cx="7019280" cy="946800"/>
           </a:xfrm>
           <a:prstGeom prst="rect">
             <a:avLst/>
@@ -5081,7 +6438,7 @@
         <p:spPr>
           <a:xfrm>
             <a:off x="504000" y="1326600"/>
-            <a:ext cx="4426920" cy="1568520"/>
+            <a:ext cx="4426920" cy="1568160"/>
           </a:xfrm>
           <a:prstGeom prst="rect">
             <a:avLst/>
@@ -5111,7 +6468,7 @@
         <p:spPr>
           <a:xfrm>
             <a:off x="5152680" y="1326600"/>
-            <a:ext cx="4426920" cy="3288600"/>
+            <a:ext cx="4426920" cy="3288240"/>
           </a:xfrm>
           <a:prstGeom prst="rect">
             <a:avLst/>
@@ -5140,8 +6497,8 @@
         </p:nvSpPr>
         <p:spPr>
           <a:xfrm>
-            <a:off x="504000" y="3044520"/>
-            <a:ext cx="4426920" cy="1568520"/>
+            <a:off x="504000" y="3044160"/>
+            <a:ext cx="4426920" cy="1568160"/>
           </a:xfrm>
           <a:prstGeom prst="rect">
             <a:avLst/>
@@ -5193,7 +6550,7 @@
         <p:spPr>
           <a:xfrm>
             <a:off x="504000" y="210600"/>
-            <a:ext cx="7019640" cy="946800"/>
+            <a:ext cx="7019280" cy="946800"/>
           </a:xfrm>
           <a:prstGeom prst="rect">
             <a:avLst/>
@@ -5224,7 +6581,7 @@
         <p:spPr>
           <a:xfrm>
             <a:off x="504000" y="1326600"/>
-            <a:ext cx="4426920" cy="3288600"/>
+            <a:ext cx="4426920" cy="3288240"/>
           </a:xfrm>
           <a:prstGeom prst="rect">
             <a:avLst/>
@@ -5254,7 +6611,7 @@
         <p:spPr>
           <a:xfrm>
             <a:off x="5152680" y="1326600"/>
-            <a:ext cx="4426920" cy="1568520"/>
+            <a:ext cx="4426920" cy="1568160"/>
           </a:xfrm>
           <a:prstGeom prst="rect">
             <a:avLst/>
@@ -5283,8 +6640,8 @@
         </p:nvSpPr>
         <p:spPr>
           <a:xfrm>
-            <a:off x="5152680" y="3044520"/>
-            <a:ext cx="4426920" cy="1568520"/>
+            <a:off x="5152680" y="3044160"/>
+            <a:ext cx="4426920" cy="1568160"/>
           </a:xfrm>
           <a:prstGeom prst="rect">
             <a:avLst/>
@@ -5336,7 +6693,7 @@
         <p:spPr>
           <a:xfrm>
             <a:off x="504000" y="210600"/>
-            <a:ext cx="7019640" cy="946800"/>
+            <a:ext cx="7019280" cy="946800"/>
           </a:xfrm>
           <a:prstGeom prst="rect">
             <a:avLst/>
@@ -5367,7 +6724,7 @@
         <p:spPr>
           <a:xfrm>
             <a:off x="504000" y="1326600"/>
-            <a:ext cx="4426920" cy="1568520"/>
+            <a:ext cx="4426920" cy="1568160"/>
           </a:xfrm>
           <a:prstGeom prst="rect">
             <a:avLst/>
@@ -5397,7 +6754,7 @@
         <p:spPr>
           <a:xfrm>
             <a:off x="5152680" y="1326600"/>
-            <a:ext cx="4426920" cy="1568520"/>
+            <a:ext cx="4426920" cy="1568160"/>
           </a:xfrm>
           <a:prstGeom prst="rect">
             <a:avLst/>
@@ -5426,8 +6783,8 @@
         </p:nvSpPr>
         <p:spPr>
           <a:xfrm>
-            <a:off x="504000" y="3044520"/>
-            <a:ext cx="9072000" cy="1568520"/>
+            <a:off x="504000" y="3044160"/>
+            <a:ext cx="9071640" cy="1568160"/>
           </a:xfrm>
           <a:prstGeom prst="rect">
             <a:avLst/>
@@ -5479,7 +6836,7 @@
         <p:spPr>
           <a:xfrm>
             <a:off x="-58320" y="81000"/>
-            <a:ext cx="7794000" cy="1205280"/>
+            <a:ext cx="7793640" cy="1204920"/>
           </a:xfrm>
           <a:prstGeom prst="rect">
             <a:avLst/>
@@ -5502,7 +6859,7 @@
         <p:spPr>
           <a:xfrm>
             <a:off x="504000" y="210600"/>
-            <a:ext cx="7019640" cy="946800"/>
+            <a:ext cx="7019280" cy="946800"/>
           </a:xfrm>
           <a:prstGeom prst="rect">
             <a:avLst/>
@@ -5510,16 +6867,17 @@
         </p:spPr>
         <p:txBody>
           <a:bodyPr lIns="0" rIns="0" tIns="0" bIns="0" anchor="ctr">
-            <a:spAutoFit/>
-          </a:bodyPr>
-          <a:p>
+            <a:noAutofit/>
+          </a:bodyPr>
+          <a:p>
+            <a:pPr algn="ctr"/>
             <a:r>
-              <a:rPr b="0" lang="en-US" sz="1800" spc="-1" strike="noStrike">
+              <a:rPr b="0" lang="en-US" sz="4400" spc="-1" strike="noStrike">
                 <a:latin typeface="Arial"/>
               </a:rPr>
               <a:t>Click to edit the title text format</a:t>
             </a:r>
-            <a:endParaRPr b="0" lang="en-US" sz="1800" spc="-1" strike="noStrike">
+            <a:endParaRPr b="0" lang="en-US" sz="4400" spc="-1" strike="noStrike">
               <a:latin typeface="Arial"/>
             </a:endParaRPr>
           </a:p>
@@ -5538,7 +6896,7 @@
         <p:spPr>
           <a:xfrm>
             <a:off x="504000" y="1326600"/>
-            <a:ext cx="9072000" cy="3288600"/>
+            <a:ext cx="9071640" cy="3288240"/>
           </a:xfrm>
           <a:prstGeom prst="rect">
             <a:avLst/>
@@ -5754,7 +7112,7 @@
         <p:spPr>
           <a:xfrm>
             <a:off x="-58320" y="81000"/>
-            <a:ext cx="7794000" cy="1205280"/>
+            <a:ext cx="7793640" cy="1204920"/>
           </a:xfrm>
           <a:prstGeom prst="rect">
             <a:avLst/>
@@ -5776,8 +7134,8 @@
         </p:nvSpPr>
         <p:spPr>
           <a:xfrm>
-            <a:off x="504000" y="210600"/>
-            <a:ext cx="7019640" cy="946800"/>
+            <a:off x="504000" y="226080"/>
+            <a:ext cx="9072000" cy="946440"/>
           </a:xfrm>
           <a:prstGeom prst="rect">
             <a:avLst/>
@@ -5785,16 +7143,17 @@
         </p:spPr>
         <p:txBody>
           <a:bodyPr lIns="0" rIns="0" tIns="0" bIns="0" anchor="ctr">
-            <a:spAutoFit/>
-          </a:bodyPr>
-          <a:p>
+            <a:noAutofit/>
+          </a:bodyPr>
+          <a:p>
+            <a:pPr algn="ctr"/>
             <a:r>
-              <a:rPr b="0" lang="en-US" sz="1800" spc="-1" strike="noStrike">
+              <a:rPr b="0" lang="en-US" sz="4400" spc="-1" strike="noStrike">
                 <a:latin typeface="Arial"/>
               </a:rPr>
               <a:t>Click to edit the title text format</a:t>
             </a:r>
-            <a:endParaRPr b="0" lang="en-US" sz="1800" spc="-1" strike="noStrike">
+            <a:endParaRPr b="0" lang="en-US" sz="4400" spc="-1" strike="noStrike">
               <a:latin typeface="Arial"/>
             </a:endParaRPr>
           </a:p>
@@ -5812,8 +7171,8 @@
         </p:nvSpPr>
         <p:spPr>
           <a:xfrm>
-            <a:off x="504000" y="1368000"/>
-            <a:ext cx="9071640" cy="3287880"/>
+            <a:off x="504000" y="1326600"/>
+            <a:ext cx="9072000" cy="3288600"/>
           </a:xfrm>
           <a:prstGeom prst="rect">
             <a:avLst/>
@@ -5836,12 +7195,12 @@
               <a:buChar char=""/>
             </a:pPr>
             <a:r>
-              <a:rPr b="0" lang="en-US" sz="1800" spc="-1" strike="noStrike">
+              <a:rPr b="0" lang="en-US" sz="3200" spc="-1" strike="noStrike">
                 <a:latin typeface="Arial"/>
               </a:rPr>
               <a:t>Click to edit the outline text format</a:t>
             </a:r>
-            <a:endParaRPr b="0" lang="en-US" sz="1800" spc="-1" strike="noStrike">
+            <a:endParaRPr b="0" lang="en-US" sz="3200" spc="-1" strike="noStrike">
               <a:latin typeface="Arial"/>
             </a:endParaRPr>
           </a:p>
@@ -5858,12 +7217,12 @@
               <a:buChar char=""/>
             </a:pPr>
             <a:r>
-              <a:rPr b="0" lang="en-US" sz="1800" spc="-1" strike="noStrike">
+              <a:rPr b="0" lang="en-US" sz="2800" spc="-1" strike="noStrike">
                 <a:latin typeface="Arial"/>
               </a:rPr>
               <a:t>Second Outline Level</a:t>
             </a:r>
-            <a:endParaRPr b="0" lang="en-US" sz="1800" spc="-1" strike="noStrike">
+            <a:endParaRPr b="0" lang="en-US" sz="2800" spc="-1" strike="noStrike">
               <a:latin typeface="Arial"/>
             </a:endParaRPr>
           </a:p>
@@ -5880,12 +7239,12 @@
               <a:buChar char=""/>
             </a:pPr>
             <a:r>
-              <a:rPr b="0" lang="en-US" sz="1800" spc="-1" strike="noStrike">
+              <a:rPr b="0" lang="en-US" sz="2400" spc="-1" strike="noStrike">
                 <a:latin typeface="Arial"/>
               </a:rPr>
               <a:t>Third Outline Level</a:t>
             </a:r>
-            <a:endParaRPr b="0" lang="en-US" sz="1800" spc="-1" strike="noStrike">
+            <a:endParaRPr b="0" lang="en-US" sz="2400" spc="-1" strike="noStrike">
               <a:latin typeface="Arial"/>
             </a:endParaRPr>
           </a:p>
@@ -5902,12 +7261,12 @@
               <a:buChar char=""/>
             </a:pPr>
             <a:r>
-              <a:rPr b="0" lang="en-US" sz="1800" spc="-1" strike="noStrike">
+              <a:rPr b="0" lang="en-US" sz="2000" spc="-1" strike="noStrike">
                 <a:latin typeface="Arial"/>
               </a:rPr>
               <a:t>Fourth Outline Level</a:t>
             </a:r>
-            <a:endParaRPr b="0" lang="en-US" sz="1800" spc="-1" strike="noStrike">
+            <a:endParaRPr b="0" lang="en-US" sz="2000" spc="-1" strike="noStrike">
               <a:latin typeface="Arial"/>
             </a:endParaRPr>
           </a:p>
@@ -5924,12 +7283,12 @@
               <a:buChar char=""/>
             </a:pPr>
             <a:r>
-              <a:rPr b="0" lang="en-US" sz="1800" spc="-1" strike="noStrike">
+              <a:rPr b="0" lang="en-US" sz="2000" spc="-1" strike="noStrike">
                 <a:latin typeface="Arial"/>
               </a:rPr>
               <a:t>Fifth Outline Level</a:t>
             </a:r>
-            <a:endParaRPr b="0" lang="en-US" sz="1800" spc="-1" strike="noStrike">
+            <a:endParaRPr b="0" lang="en-US" sz="2000" spc="-1" strike="noStrike">
               <a:latin typeface="Arial"/>
             </a:endParaRPr>
           </a:p>
@@ -5946,12 +7305,12 @@
               <a:buChar char=""/>
             </a:pPr>
             <a:r>
-              <a:rPr b="0" lang="en-US" sz="1800" spc="-1" strike="noStrike">
+              <a:rPr b="0" lang="en-US" sz="2000" spc="-1" strike="noStrike">
                 <a:latin typeface="Arial"/>
               </a:rPr>
               <a:t>Sixth Outline Level</a:t>
             </a:r>
-            <a:endParaRPr b="0" lang="en-US" sz="1800" spc="-1" strike="noStrike">
+            <a:endParaRPr b="0" lang="en-US" sz="2000" spc="-1" strike="noStrike">
               <a:latin typeface="Arial"/>
             </a:endParaRPr>
           </a:p>
@@ -5968,12 +7327,12 @@
               <a:buChar char=""/>
             </a:pPr>
             <a:r>
-              <a:rPr b="0" lang="en-US" sz="1800" spc="-1" strike="noStrike">
+              <a:rPr b="0" lang="en-US" sz="2000" spc="-1" strike="noStrike">
                 <a:latin typeface="Arial"/>
               </a:rPr>
               <a:t>Seventh Outline Level</a:t>
             </a:r>
-            <a:endParaRPr b="0" lang="en-US" sz="1800" spc="-1" strike="noStrike">
+            <a:endParaRPr b="0" lang="en-US" sz="2000" spc="-1" strike="noStrike">
               <a:latin typeface="Arial"/>
             </a:endParaRPr>
           </a:p>
@@ -6029,7 +7388,7 @@
         <p:spPr>
           <a:xfrm>
             <a:off x="-58320" y="81000"/>
-            <a:ext cx="7794000" cy="1205280"/>
+            <a:ext cx="7793640" cy="1204920"/>
           </a:xfrm>
           <a:prstGeom prst="rect">
             <a:avLst/>
@@ -6052,7 +7411,7 @@
         <p:spPr>
           <a:xfrm>
             <a:off x="504000" y="210600"/>
-            <a:ext cx="7019640" cy="946800"/>
+            <a:ext cx="7019280" cy="946800"/>
           </a:xfrm>
           <a:prstGeom prst="rect">
             <a:avLst/>
@@ -6060,16 +7419,17 @@
         </p:spPr>
         <p:txBody>
           <a:bodyPr lIns="0" rIns="0" tIns="0" bIns="0" anchor="ctr">
-            <a:spAutoFit/>
-          </a:bodyPr>
-          <a:p>
+            <a:noAutofit/>
+          </a:bodyPr>
+          <a:p>
+            <a:pPr algn="ctr"/>
             <a:r>
-              <a:rPr b="0" lang="en-US" sz="1800" spc="-1" strike="noStrike">
+              <a:rPr b="0" lang="en-US" sz="4400" spc="-1" strike="noStrike">
                 <a:latin typeface="Arial"/>
               </a:rPr>
               <a:t>Click to edit the title text format</a:t>
             </a:r>
-            <a:endParaRPr b="0" lang="en-US" sz="1800" spc="-1" strike="noStrike">
+            <a:endParaRPr b="0" lang="en-US" sz="4400" spc="-1" strike="noStrike">
               <a:latin typeface="Arial"/>
             </a:endParaRPr>
           </a:p>
@@ -6304,7 +7664,7 @@
         <p:spPr>
           <a:xfrm>
             <a:off x="-58320" y="81000"/>
-            <a:ext cx="7794000" cy="1205280"/>
+            <a:ext cx="7793640" cy="1204920"/>
           </a:xfrm>
           <a:prstGeom prst="rect">
             <a:avLst/>
@@ -6546,6 +7906,282 @@
     <p:sldLayoutId id="2147483697" r:id="rId12"/>
     <p:sldLayoutId id="2147483698" r:id="rId13"/>
     <p:sldLayoutId id="2147483699" r:id="rId14"/>
+  </p:sldLayoutIdLst>
+</p:sldMaster>
+</file>
+
+<file path=ppt/slideMasters/slideMaster5.xml><?xml version="1.0" encoding="utf-8"?>
+<p:sldMaster xmlns:a="http://schemas.openxmlformats.org/drawingml/2006/main" xmlns:p="http://schemas.openxmlformats.org/presentationml/2006/main" xmlns:r="http://schemas.openxmlformats.org/officeDocument/2006/relationships" xmlns:p14="http://schemas.microsoft.com/office/powerpoint/2010/main" xmlns:p15="http://schemas.microsoft.com/office/powerpoint/2012/main" xmlns:mc="http://schemas.openxmlformats.org/markup-compatibility/2006">
+  <p:cSld>
+    <p:spTree>
+      <p:nvGrpSpPr>
+        <p:cNvPr id="1" name=""/>
+        <p:cNvGrpSpPr/>
+        <p:nvPr/>
+      </p:nvGrpSpPr>
+      <p:grpSpPr>
+        <a:xfrm>
+          <a:off x="0" y="0"/>
+          <a:ext cx="0" cy="0"/>
+          <a:chOff x="0" y="0"/>
+          <a:chExt cx="0" cy="0"/>
+        </a:xfrm>
+      </p:grpSpPr>
+      <p:pic>
+        <p:nvPicPr>
+          <p:cNvPr id="156" name="" descr=""/>
+          <p:cNvPicPr/>
+          <p:nvPr/>
+        </p:nvPicPr>
+        <p:blipFill>
+          <a:blip r:embed="rId2"/>
+          <a:stretch/>
+        </p:blipFill>
+        <p:spPr>
+          <a:xfrm>
+            <a:off x="-58320" y="81000"/>
+            <a:ext cx="7793640" cy="1204920"/>
+          </a:xfrm>
+          <a:prstGeom prst="rect">
+            <a:avLst/>
+          </a:prstGeom>
+          <a:ln>
+            <a:noFill/>
+          </a:ln>
+        </p:spPr>
+      </p:pic>
+      <p:sp>
+        <p:nvSpPr>
+          <p:cNvPr id="157" name="PlaceHolder 1"/>
+          <p:cNvSpPr>
+            <a:spLocks noGrp="1"/>
+          </p:cNvSpPr>
+          <p:nvPr>
+            <p:ph type="title"/>
+          </p:nvPr>
+        </p:nvSpPr>
+        <p:spPr>
+          <a:xfrm>
+            <a:off x="504000" y="210600"/>
+            <a:ext cx="7019280" cy="946800"/>
+          </a:xfrm>
+          <a:prstGeom prst="rect">
+            <a:avLst/>
+          </a:prstGeom>
+        </p:spPr>
+        <p:txBody>
+          <a:bodyPr lIns="0" rIns="0" tIns="0" bIns="0" anchor="ctr">
+            <a:noAutofit/>
+          </a:bodyPr>
+          <a:p>
+            <a:pPr algn="ctr"/>
+            <a:r>
+              <a:rPr b="0" lang="en-US" sz="4400" spc="-1" strike="noStrike">
+                <a:latin typeface="Arial"/>
+              </a:rPr>
+              <a:t>Click to edit the title text format</a:t>
+            </a:r>
+            <a:endParaRPr b="0" lang="en-US" sz="4400" spc="-1" strike="noStrike">
+              <a:latin typeface="Arial"/>
+            </a:endParaRPr>
+          </a:p>
+        </p:txBody>
+      </p:sp>
+      <p:sp>
+        <p:nvSpPr>
+          <p:cNvPr id="158" name="PlaceHolder 2"/>
+          <p:cNvSpPr>
+            <a:spLocks noGrp="1"/>
+          </p:cNvSpPr>
+          <p:nvPr>
+            <p:ph type="body"/>
+          </p:nvPr>
+        </p:nvSpPr>
+        <p:spPr>
+          <a:xfrm>
+            <a:off x="504000" y="1326600"/>
+            <a:ext cx="9071640" cy="3288240"/>
+          </a:xfrm>
+          <a:prstGeom prst="rect">
+            <a:avLst/>
+          </a:prstGeom>
+        </p:spPr>
+        <p:txBody>
+          <a:bodyPr lIns="0" rIns="0" tIns="0" bIns="0">
+            <a:normAutofit/>
+          </a:bodyPr>
+          <a:p>
+            <a:pPr marL="432000" indent="-324000">
+              <a:spcBef>
+                <a:spcPts val="1417"/>
+              </a:spcBef>
+              <a:buClr>
+                <a:srgbClr val="000000"/>
+              </a:buClr>
+              <a:buSzPct val="45000"/>
+              <a:buFont typeface="Wingdings" charset="2"/>
+              <a:buChar char=""/>
+            </a:pPr>
+            <a:r>
+              <a:rPr b="0" lang="en-US" sz="3200" spc="-1" strike="noStrike">
+                <a:latin typeface="Arial"/>
+              </a:rPr>
+              <a:t>Click to edit the outline text format</a:t>
+            </a:r>
+            <a:endParaRPr b="0" lang="en-US" sz="3200" spc="-1" strike="noStrike">
+              <a:latin typeface="Arial"/>
+            </a:endParaRPr>
+          </a:p>
+          <a:p>
+            <a:pPr lvl="1" marL="864000" indent="-324000">
+              <a:spcBef>
+                <a:spcPts val="1134"/>
+              </a:spcBef>
+              <a:buClr>
+                <a:srgbClr val="000000"/>
+              </a:buClr>
+              <a:buSzPct val="75000"/>
+              <a:buFont typeface="Symbol" charset="2"/>
+              <a:buChar char=""/>
+            </a:pPr>
+            <a:r>
+              <a:rPr b="0" lang="en-US" sz="2800" spc="-1" strike="noStrike">
+                <a:latin typeface="Arial"/>
+              </a:rPr>
+              <a:t>Second Outline Level</a:t>
+            </a:r>
+            <a:endParaRPr b="0" lang="en-US" sz="2800" spc="-1" strike="noStrike">
+              <a:latin typeface="Arial"/>
+            </a:endParaRPr>
+          </a:p>
+          <a:p>
+            <a:pPr lvl="2" marL="1296000" indent="-288000">
+              <a:spcBef>
+                <a:spcPts val="850"/>
+              </a:spcBef>
+              <a:buClr>
+                <a:srgbClr val="000000"/>
+              </a:buClr>
+              <a:buSzPct val="45000"/>
+              <a:buFont typeface="Wingdings" charset="2"/>
+              <a:buChar char=""/>
+            </a:pPr>
+            <a:r>
+              <a:rPr b="0" lang="en-US" sz="2400" spc="-1" strike="noStrike">
+                <a:latin typeface="Arial"/>
+              </a:rPr>
+              <a:t>Third Outline Level</a:t>
+            </a:r>
+            <a:endParaRPr b="0" lang="en-US" sz="2400" spc="-1" strike="noStrike">
+              <a:latin typeface="Arial"/>
+            </a:endParaRPr>
+          </a:p>
+          <a:p>
+            <a:pPr lvl="3" marL="1728000" indent="-216000">
+              <a:spcBef>
+                <a:spcPts val="567"/>
+              </a:spcBef>
+              <a:buClr>
+                <a:srgbClr val="000000"/>
+              </a:buClr>
+              <a:buSzPct val="75000"/>
+              <a:buFont typeface="Symbol" charset="2"/>
+              <a:buChar char=""/>
+            </a:pPr>
+            <a:r>
+              <a:rPr b="0" lang="en-US" sz="2000" spc="-1" strike="noStrike">
+                <a:latin typeface="Arial"/>
+              </a:rPr>
+              <a:t>Fourth Outline Level</a:t>
+            </a:r>
+            <a:endParaRPr b="0" lang="en-US" sz="2000" spc="-1" strike="noStrike">
+              <a:latin typeface="Arial"/>
+            </a:endParaRPr>
+          </a:p>
+          <a:p>
+            <a:pPr lvl="4" marL="2160000" indent="-216000">
+              <a:spcBef>
+                <a:spcPts val="283"/>
+              </a:spcBef>
+              <a:buClr>
+                <a:srgbClr val="000000"/>
+              </a:buClr>
+              <a:buSzPct val="45000"/>
+              <a:buFont typeface="Wingdings" charset="2"/>
+              <a:buChar char=""/>
+            </a:pPr>
+            <a:r>
+              <a:rPr b="0" lang="en-US" sz="2000" spc="-1" strike="noStrike">
+                <a:latin typeface="Arial"/>
+              </a:rPr>
+              <a:t>Fifth Outline Level</a:t>
+            </a:r>
+            <a:endParaRPr b="0" lang="en-US" sz="2000" spc="-1" strike="noStrike">
+              <a:latin typeface="Arial"/>
+            </a:endParaRPr>
+          </a:p>
+          <a:p>
+            <a:pPr lvl="5" marL="2592000" indent="-216000">
+              <a:spcBef>
+                <a:spcPts val="283"/>
+              </a:spcBef>
+              <a:buClr>
+                <a:srgbClr val="000000"/>
+              </a:buClr>
+              <a:buSzPct val="45000"/>
+              <a:buFont typeface="Wingdings" charset="2"/>
+              <a:buChar char=""/>
+            </a:pPr>
+            <a:r>
+              <a:rPr b="0" lang="en-US" sz="2000" spc="-1" strike="noStrike">
+                <a:latin typeface="Arial"/>
+              </a:rPr>
+              <a:t>Sixth Outline Level</a:t>
+            </a:r>
+            <a:endParaRPr b="0" lang="en-US" sz="2000" spc="-1" strike="noStrike">
+              <a:latin typeface="Arial"/>
+            </a:endParaRPr>
+          </a:p>
+          <a:p>
+            <a:pPr lvl="6" marL="3024000" indent="-216000">
+              <a:spcBef>
+                <a:spcPts val="283"/>
+              </a:spcBef>
+              <a:buClr>
+                <a:srgbClr val="000000"/>
+              </a:buClr>
+              <a:buSzPct val="45000"/>
+              <a:buFont typeface="Wingdings" charset="2"/>
+              <a:buChar char=""/>
+            </a:pPr>
+            <a:r>
+              <a:rPr b="0" lang="en-US" sz="2000" spc="-1" strike="noStrike">
+                <a:latin typeface="Arial"/>
+              </a:rPr>
+              <a:t>Seventh Outline Level</a:t>
+            </a:r>
+            <a:endParaRPr b="0" lang="en-US" sz="2000" spc="-1" strike="noStrike">
+              <a:latin typeface="Arial"/>
+            </a:endParaRPr>
+          </a:p>
+        </p:txBody>
+      </p:sp>
+    </p:spTree>
+  </p:cSld>
+  <p:clrMap bg1="lt1" bg2="lt2" tx1="dk1" tx2="dk2" accent1="accent1" accent2="accent2" accent3="accent3" accent4="accent4" accent5="accent5" accent6="accent6" hlink="hlink" folHlink="folHlink"/>
+  <p:sldLayoutIdLst>
+    <p:sldLayoutId id="2147483701" r:id="rId3"/>
+    <p:sldLayoutId id="2147483702" r:id="rId4"/>
+    <p:sldLayoutId id="2147483703" r:id="rId5"/>
+    <p:sldLayoutId id="2147483704" r:id="rId6"/>
+    <p:sldLayoutId id="2147483705" r:id="rId7"/>
+    <p:sldLayoutId id="2147483706" r:id="rId8"/>
+    <p:sldLayoutId id="2147483707" r:id="rId9"/>
+    <p:sldLayoutId id="2147483708" r:id="rId10"/>
+    <p:sldLayoutId id="2147483709" r:id="rId11"/>
+    <p:sldLayoutId id="2147483710" r:id="rId12"/>
+    <p:sldLayoutId id="2147483711" r:id="rId13"/>
+    <p:sldLayoutId id="2147483712" r:id="rId14"/>
   </p:sldLayoutIdLst>
 </p:sldMaster>
 </file>
@@ -6569,14 +8205,14 @@
       </p:grpSpPr>
       <p:sp>
         <p:nvSpPr>
-          <p:cNvPr id="156" name="CustomShape 1"/>
+          <p:cNvPr id="195" name="CustomShape 1"/>
           <p:cNvSpPr/>
           <p:nvPr/>
         </p:nvSpPr>
         <p:spPr>
           <a:xfrm>
             <a:off x="504000" y="411480"/>
-            <a:ext cx="7019640" cy="544320"/>
+            <a:ext cx="7019280" cy="543960"/>
           </a:xfrm>
           <a:prstGeom prst="rect">
             <a:avLst/>
@@ -6608,6 +8244,7 @@
                   <a:srgbClr val="ffffff"/>
                 </a:solidFill>
                 <a:latin typeface="Arial"/>
+                <a:ea typeface="DejaVu Sans"/>
               </a:rPr>
               <a:t>Fastai Lesson 10a review</a:t>
             </a:r>
@@ -6619,14 +8256,14 @@
       </p:sp>
       <p:sp>
         <p:nvSpPr>
-          <p:cNvPr id="157" name="CustomShape 2"/>
+          <p:cNvPr id="196" name="CustomShape 2"/>
           <p:cNvSpPr/>
           <p:nvPr/>
         </p:nvSpPr>
         <p:spPr>
           <a:xfrm>
             <a:off x="504000" y="2401560"/>
-            <a:ext cx="9071640" cy="1220400"/>
+            <a:ext cx="9071280" cy="1220040"/>
           </a:xfrm>
           <a:prstGeom prst="rect">
             <a:avLst/>
@@ -6770,14 +8407,14 @@
       </p:grpSpPr>
       <p:sp>
         <p:nvSpPr>
-          <p:cNvPr id="173" name="TextShape 1"/>
-          <p:cNvSpPr txBox="1"/>
+          <p:cNvPr id="212" name="CustomShape 1"/>
+          <p:cNvSpPr/>
           <p:nvPr/>
         </p:nvSpPr>
         <p:spPr>
           <a:xfrm>
-            <a:off x="504000" y="210600"/>
-            <a:ext cx="7019640" cy="946800"/>
+            <a:off x="504000" y="44280"/>
+            <a:ext cx="7019280" cy="1279080"/>
           </a:xfrm>
           <a:prstGeom prst="rect">
             <a:avLst/>
@@ -6787,22 +8424,33 @@
             <a:noFill/>
           </a:ln>
         </p:spPr>
+        <p:style>
+          <a:lnRef idx="0"/>
+          <a:fillRef idx="0"/>
+          <a:effectRef idx="0"/>
+          <a:fontRef idx="minor"/>
+        </p:style>
         <p:txBody>
           <a:bodyPr lIns="0" rIns="0" tIns="0" bIns="0" anchor="ctr">
             <a:spAutoFit/>
           </a:bodyPr>
           <a:p>
-            <a:pPr algn="ctr"/>
+            <a:pPr>
+              <a:lnSpc>
+                <a:spcPct val="100000"/>
+              </a:lnSpc>
+            </a:pPr>
             <a:r>
-              <a:rPr b="0" lang="en-US" sz="3600" spc="-1" strike="noStrike">
+              <a:rPr b="0" lang="en-US" sz="2800" spc="-1" strike="noStrike">
                 <a:solidFill>
                   <a:srgbClr val="ffffff"/>
                 </a:solidFill>
                 <a:latin typeface="Arial"/>
+                <a:ea typeface="DejaVu Sans"/>
               </a:rPr>
-              <a:t>Software Engineering, cont’d.</a:t>
+              <a:t>What does softmax do when two samples have weights that differ by a constant? cont’d</a:t>
             </a:r>
-            <a:endParaRPr b="0" lang="en-US" sz="3600" spc="-1" strike="noStrike">
+            <a:endParaRPr b="0" lang="en-US" sz="2800" spc="-1" strike="noStrike">
               <a:latin typeface="Arial"/>
             </a:endParaRPr>
           </a:p>
@@ -6810,7 +8458,7 @@
       </p:sp>
       <p:pic>
         <p:nvPicPr>
-          <p:cNvPr id="174" name="" descr=""/>
+          <p:cNvPr id="213" name="" descr=""/>
           <p:cNvPicPr/>
           <p:nvPr/>
         </p:nvPicPr>
@@ -6820,8 +8468,8 @@
         </p:blipFill>
         <p:spPr>
           <a:xfrm>
-            <a:off x="0" y="1225800"/>
-            <a:ext cx="7498080" cy="4403520"/>
+            <a:off x="0" y="1302120"/>
+            <a:ext cx="7863120" cy="4330080"/>
           </a:xfrm>
           <a:prstGeom prst="rect">
             <a:avLst/>
@@ -6863,14 +8511,14 @@
       </p:grpSpPr>
       <p:sp>
         <p:nvSpPr>
-          <p:cNvPr id="175" name="CustomShape 1"/>
+          <p:cNvPr id="214" name="CustomShape 1"/>
           <p:cNvSpPr/>
           <p:nvPr/>
         </p:nvSpPr>
         <p:spPr>
           <a:xfrm>
             <a:off x="504000" y="439560"/>
-            <a:ext cx="7019640" cy="488160"/>
+            <a:ext cx="7019280" cy="487800"/>
           </a:xfrm>
           <a:prstGeom prst="rect">
             <a:avLst/>
@@ -6902,6 +8550,7 @@
                   <a:srgbClr val="ffffff"/>
                 </a:solidFill>
                 <a:latin typeface="Arial"/>
+                <a:ea typeface="DejaVu Sans"/>
               </a:rPr>
               <a:t>Review notebooks (live, in Zoom chat)</a:t>
             </a:r>
@@ -6913,14 +8562,14 @@
       </p:sp>
       <p:sp>
         <p:nvSpPr>
-          <p:cNvPr id="176" name="TextShape 2"/>
-          <p:cNvSpPr txBox="1"/>
+          <p:cNvPr id="215" name="CustomShape 2"/>
+          <p:cNvSpPr/>
           <p:nvPr/>
         </p:nvSpPr>
         <p:spPr>
           <a:xfrm>
             <a:off x="504000" y="1326600"/>
-            <a:ext cx="9072000" cy="3288600"/>
+            <a:ext cx="9071640" cy="3288240"/>
           </a:xfrm>
           <a:prstGeom prst="rect">
             <a:avLst/>
@@ -6930,12 +8579,18 @@
             <a:noFill/>
           </a:ln>
         </p:spPr>
-        <p:txBody>
-          <a:bodyPr lIns="0" rIns="0" tIns="0" bIns="0">
-            <a:normAutofit/>
-          </a:bodyPr>
-          <a:p>
-            <a:pPr marL="432000" indent="-324000">
+        <p:style>
+          <a:lnRef idx="0"/>
+          <a:fillRef idx="0"/>
+          <a:effectRef idx="0"/>
+          <a:fontRef idx="minor"/>
+        </p:style>
+        <p:txBody>
+          <a:bodyPr lIns="0" rIns="0" tIns="0" bIns="0">
+            <a:normAutofit/>
+          </a:bodyPr>
+          <a:p>
+            <a:pPr marL="432000" indent="-323640">
               <a:lnSpc>
                 <a:spcPct val="100000"/>
               </a:lnSpc>
@@ -6957,7 +8612,7 @@
             </a:endParaRPr>
           </a:p>
           <a:p>
-            <a:pPr marL="432000" indent="-324000">
+            <a:pPr marL="432000" indent="-323640">
               <a:lnSpc>
                 <a:spcPct val="100000"/>
               </a:lnSpc>
@@ -6979,7 +8634,7 @@
             </a:endParaRPr>
           </a:p>
           <a:p>
-            <a:pPr marL="432000" indent="-324000">
+            <a:pPr marL="432000" indent="-323640">
               <a:lnSpc>
                 <a:spcPct val="100000"/>
               </a:lnSpc>
@@ -7001,7 +8656,7 @@
             </a:endParaRPr>
           </a:p>
           <a:p>
-            <a:pPr marL="432000" indent="-324000">
+            <a:pPr marL="432000" indent="-323640">
               <a:lnSpc>
                 <a:spcPct val="100000"/>
               </a:lnSpc>
@@ -7023,7 +8678,7 @@
             </a:endParaRPr>
           </a:p>
           <a:p>
-            <a:pPr marL="432000" indent="-324000">
+            <a:pPr marL="432000" indent="-323640">
               <a:lnSpc>
                 <a:spcPct val="100000"/>
               </a:lnSpc>
@@ -7045,7 +8700,7 @@
             </a:endParaRPr>
           </a:p>
           <a:p>
-            <a:pPr marL="432000" indent="-324000">
+            <a:pPr marL="432000" indent="-323640">
               <a:lnSpc>
                 <a:spcPct val="100000"/>
               </a:lnSpc>
@@ -7100,14 +8755,14 @@
       </p:grpSpPr>
       <p:sp>
         <p:nvSpPr>
-          <p:cNvPr id="158" name="CustomShape 1"/>
+          <p:cNvPr id="197" name="CustomShape 1"/>
           <p:cNvSpPr/>
           <p:nvPr/>
         </p:nvSpPr>
         <p:spPr>
           <a:xfrm>
             <a:off x="504000" y="411480"/>
-            <a:ext cx="7019640" cy="544320"/>
+            <a:ext cx="7019280" cy="543960"/>
           </a:xfrm>
           <a:prstGeom prst="rect">
             <a:avLst/>
@@ -7139,6 +8794,7 @@
                   <a:srgbClr val="ffffff"/>
                 </a:solidFill>
                 <a:latin typeface="Arial"/>
+                <a:ea typeface="DejaVu Sans"/>
               </a:rPr>
               <a:t>Overview of Lesson 10a</a:t>
             </a:r>
@@ -7150,14 +8806,14 @@
       </p:sp>
       <p:sp>
         <p:nvSpPr>
-          <p:cNvPr id="159" name="CustomShape 2"/>
+          <p:cNvPr id="198" name="CustomShape 2"/>
           <p:cNvSpPr/>
           <p:nvPr/>
         </p:nvSpPr>
         <p:spPr>
           <a:xfrm>
             <a:off x="504000" y="1368000"/>
-            <a:ext cx="9071640" cy="3287880"/>
+            <a:ext cx="9071280" cy="3287520"/>
           </a:xfrm>
           <a:prstGeom prst="rect">
             <a:avLst/>
@@ -7178,7 +8834,7 @@
             <a:normAutofit fontScale="81000"/>
           </a:bodyPr>
           <a:p>
-            <a:pPr marL="432000" indent="-323640">
+            <a:pPr marL="432000" indent="-323280">
               <a:lnSpc>
                 <a:spcPct val="100000"/>
               </a:lnSpc>
@@ -7194,7 +8850,11 @@
             </a:pPr>
             <a:r>
               <a:rPr b="0" lang="en-US" sz="2600" spc="-1" strike="noStrike">
+                <a:solidFill>
+                  <a:srgbClr val="000000"/>
+                </a:solidFill>
                 <a:latin typeface="Arial"/>
+                <a:ea typeface="DejaVu Sans"/>
               </a:rPr>
               <a:t>Software Engineering</a:t>
             </a:r>
@@ -7203,7 +8863,7 @@
             </a:endParaRPr>
           </a:p>
           <a:p>
-            <a:pPr marL="432000" indent="-323640">
+            <a:pPr marL="432000" indent="-323280">
               <a:lnSpc>
                 <a:spcPct val="100000"/>
               </a:lnSpc>
@@ -7219,7 +8879,11 @@
             </a:pPr>
             <a:r>
               <a:rPr b="0" lang="en-US" sz="2600" spc="-1" strike="noStrike">
+                <a:solidFill>
+                  <a:srgbClr val="000000"/>
+                </a:solidFill>
                 <a:latin typeface="Arial"/>
+                <a:ea typeface="DejaVu Sans"/>
               </a:rPr>
               <a:t>Softmax discussion</a:t>
             </a:r>
@@ -7228,7 +8892,7 @@
             </a:endParaRPr>
           </a:p>
           <a:p>
-            <a:pPr marL="432000" indent="-323640">
+            <a:pPr marL="432000" indent="-323280">
               <a:lnSpc>
                 <a:spcPct val="100000"/>
               </a:lnSpc>
@@ -7244,7 +8908,11 @@
             </a:pPr>
             <a:r>
               <a:rPr b="0" lang="en-US" sz="2600" spc="-1" strike="noStrike">
+                <a:solidFill>
+                  <a:srgbClr val="000000"/>
+                </a:solidFill>
                 <a:latin typeface="Arial"/>
+                <a:ea typeface="DejaVu Sans"/>
               </a:rPr>
               <a:t>Notebooks:</a:t>
             </a:r>
@@ -7253,7 +8921,7 @@
             </a:endParaRPr>
           </a:p>
           <a:p>
-            <a:pPr lvl="1" marL="864000" indent="-323640">
+            <a:pPr lvl="1" marL="864000" indent="-323280">
               <a:lnSpc>
                 <a:spcPct val="100000"/>
               </a:lnSpc>
@@ -7269,7 +8937,11 @@
             </a:pPr>
             <a:r>
               <a:rPr b="0" lang="en-US" sz="2280" spc="-1" strike="noStrike">
+                <a:solidFill>
+                  <a:srgbClr val="000000"/>
+                </a:solidFill>
                 <a:latin typeface="Arial"/>
+                <a:ea typeface="DejaVu Sans"/>
               </a:rPr>
               <a:t>05_anneal</a:t>
             </a:r>
@@ -7278,7 +8950,7 @@
             </a:endParaRPr>
           </a:p>
           <a:p>
-            <a:pPr lvl="1" marL="864000" indent="-323640">
+            <a:pPr lvl="1" marL="864000" indent="-323280">
               <a:lnSpc>
                 <a:spcPct val="100000"/>
               </a:lnSpc>
@@ -7294,7 +8966,11 @@
             </a:pPr>
             <a:r>
               <a:rPr b="0" lang="en-US" sz="2280" spc="-1" strike="noStrike">
+                <a:solidFill>
+                  <a:srgbClr val="000000"/>
+                </a:solidFill>
                 <a:latin typeface="Arial"/>
+                <a:ea typeface="DejaVu Sans"/>
               </a:rPr>
               <a:t>05a_foundations</a:t>
             </a:r>
@@ -7303,7 +8979,7 @@
             </a:endParaRPr>
           </a:p>
           <a:p>
-            <a:pPr lvl="1" marL="864000" indent="-323640">
+            <a:pPr lvl="1" marL="864000" indent="-323280">
               <a:lnSpc>
                 <a:spcPct val="100000"/>
               </a:lnSpc>
@@ -7319,7 +8995,11 @@
             </a:pPr>
             <a:r>
               <a:rPr b="0" lang="en-US" sz="2280" spc="-1" strike="noStrike">
+                <a:solidFill>
+                  <a:srgbClr val="000000"/>
+                </a:solidFill>
                 <a:latin typeface="Arial"/>
+                <a:ea typeface="DejaVu Sans"/>
               </a:rPr>
               <a:t>05b_early_stopping</a:t>
             </a:r>
@@ -7328,7 +9008,7 @@
             </a:endParaRPr>
           </a:p>
           <a:p>
-            <a:pPr marL="432000" indent="-323640">
+            <a:pPr marL="432000" indent="-323280">
               <a:lnSpc>
                 <a:spcPct val="100000"/>
               </a:lnSpc>
@@ -7344,7 +9024,11 @@
             </a:pPr>
             <a:r>
               <a:rPr b="0" lang="en-US" sz="2600" spc="-1" strike="noStrike">
+                <a:solidFill>
+                  <a:srgbClr val="000000"/>
+                </a:solidFill>
                 <a:latin typeface="Arial"/>
+                <a:ea typeface="DejaVu Sans"/>
               </a:rPr>
               <a:t>We’ll stop at 1:00:40 in Lesson 10 video</a:t>
             </a:r>
@@ -7353,7 +9037,7 @@
             </a:endParaRPr>
           </a:p>
           <a:p>
-            <a:pPr marL="432000" indent="-323640">
+            <a:pPr marL="432000" indent="-323280">
               <a:lnSpc>
                 <a:spcPct val="100000"/>
               </a:lnSpc>
@@ -7369,7 +9053,11 @@
             </a:pPr>
             <a:r>
               <a:rPr b="0" lang="en-US" sz="2600" spc="-1" strike="noStrike">
+                <a:solidFill>
+                  <a:srgbClr val="000000"/>
+                </a:solidFill>
                 <a:latin typeface="Arial"/>
+                <a:ea typeface="DejaVu Sans"/>
               </a:rPr>
               <a:t>We’ll cover the rest of Lesson 10 next week</a:t>
             </a:r>
@@ -7409,9 +9097,59 @@
           <a:chExt cx="0" cy="0"/>
         </a:xfrm>
       </p:grpSpPr>
+      <p:sp>
+        <p:nvSpPr>
+          <p:cNvPr id="199" name="CustomShape 1"/>
+          <p:cNvSpPr/>
+          <p:nvPr/>
+        </p:nvSpPr>
+        <p:spPr>
+          <a:xfrm>
+            <a:off x="504000" y="408960"/>
+            <a:ext cx="7019280" cy="549360"/>
+          </a:xfrm>
+          <a:prstGeom prst="rect">
+            <a:avLst/>
+          </a:prstGeom>
+          <a:noFill/>
+          <a:ln>
+            <a:noFill/>
+          </a:ln>
+        </p:spPr>
+        <p:style>
+          <a:lnRef idx="0"/>
+          <a:fillRef idx="0"/>
+          <a:effectRef idx="0"/>
+          <a:fontRef idx="minor"/>
+        </p:style>
+        <p:txBody>
+          <a:bodyPr lIns="0" rIns="0" tIns="0" bIns="0" anchor="ctr">
+            <a:spAutoFit/>
+          </a:bodyPr>
+          <a:p>
+            <a:pPr algn="ctr">
+              <a:lnSpc>
+                <a:spcPct val="100000"/>
+              </a:lnSpc>
+            </a:pPr>
+            <a:r>
+              <a:rPr b="0" lang="en-US" sz="3600" spc="-1" strike="noStrike">
+                <a:solidFill>
+                  <a:srgbClr val="ffffff"/>
+                </a:solidFill>
+                <a:latin typeface="Arial"/>
+              </a:rPr>
+              <a:t>A Note on Software Engineering</a:t>
+            </a:r>
+            <a:endParaRPr b="0" lang="en-US" sz="3600" spc="-1" strike="noStrike">
+              <a:latin typeface="Arial"/>
+            </a:endParaRPr>
+          </a:p>
+        </p:txBody>
+      </p:sp>
       <p:pic>
         <p:nvPicPr>
-          <p:cNvPr id="160" name="" descr=""/>
+          <p:cNvPr id="200" name="" descr=""/>
           <p:cNvPicPr/>
           <p:nvPr/>
         </p:nvPicPr>
@@ -7421,8 +9159,8 @@
         </p:blipFill>
         <p:spPr>
           <a:xfrm>
-            <a:off x="30240" y="1308960"/>
-            <a:ext cx="10079280" cy="4363560"/>
+            <a:off x="1188720" y="1280160"/>
+            <a:ext cx="7863480" cy="4365000"/>
           </a:xfrm>
           <a:prstGeom prst="rect">
             <a:avLst/>
@@ -7432,56 +9170,6 @@
           </a:ln>
         </p:spPr>
       </p:pic>
-      <p:sp>
-        <p:nvSpPr>
-          <p:cNvPr id="161" name="CustomShape 1"/>
-          <p:cNvSpPr/>
-          <p:nvPr/>
-        </p:nvSpPr>
-        <p:spPr>
-          <a:xfrm>
-            <a:off x="504000" y="439560"/>
-            <a:ext cx="7019640" cy="488160"/>
-          </a:xfrm>
-          <a:prstGeom prst="rect">
-            <a:avLst/>
-          </a:prstGeom>
-          <a:noFill/>
-          <a:ln>
-            <a:noFill/>
-          </a:ln>
-        </p:spPr>
-        <p:style>
-          <a:lnRef idx="0"/>
-          <a:fillRef idx="0"/>
-          <a:effectRef idx="0"/>
-          <a:fontRef idx="minor"/>
-        </p:style>
-        <p:txBody>
-          <a:bodyPr lIns="0" rIns="0" tIns="0" bIns="0" anchor="ctr">
-            <a:spAutoFit/>
-          </a:bodyPr>
-          <a:p>
-            <a:pPr>
-              <a:lnSpc>
-                <a:spcPct val="100000"/>
-              </a:lnSpc>
-            </a:pPr>
-            <a:r>
-              <a:rPr b="0" lang="en-US" sz="3200" spc="-1" strike="noStrike">
-                <a:solidFill>
-                  <a:srgbClr val="ffffff"/>
-                </a:solidFill>
-                <a:latin typeface="Arial"/>
-              </a:rPr>
-              <a:t>Softmax definition and implementation</a:t>
-            </a:r>
-            <a:endParaRPr b="0" lang="en-US" sz="3200" spc="-1" strike="noStrike">
-              <a:latin typeface="Arial"/>
-            </a:endParaRPr>
-          </a:p>
-        </p:txBody>
-      </p:sp>
     </p:spTree>
   </p:cSld>
   <mc:AlternateContent>
@@ -7512,9 +9200,59 @@
           <a:chExt cx="0" cy="0"/>
         </a:xfrm>
       </p:grpSpPr>
+      <p:sp>
+        <p:nvSpPr>
+          <p:cNvPr id="201" name="CustomShape 1"/>
+          <p:cNvSpPr/>
+          <p:nvPr/>
+        </p:nvSpPr>
+        <p:spPr>
+          <a:xfrm>
+            <a:off x="504000" y="408960"/>
+            <a:ext cx="7019280" cy="549360"/>
+          </a:xfrm>
+          <a:prstGeom prst="rect">
+            <a:avLst/>
+          </a:prstGeom>
+          <a:noFill/>
+          <a:ln>
+            <a:noFill/>
+          </a:ln>
+        </p:spPr>
+        <p:style>
+          <a:lnRef idx="0"/>
+          <a:fillRef idx="0"/>
+          <a:effectRef idx="0"/>
+          <a:fontRef idx="minor"/>
+        </p:style>
+        <p:txBody>
+          <a:bodyPr lIns="0" rIns="0" tIns="0" bIns="0" anchor="ctr">
+            <a:spAutoFit/>
+          </a:bodyPr>
+          <a:p>
+            <a:pPr algn="ctr">
+              <a:lnSpc>
+                <a:spcPct val="100000"/>
+              </a:lnSpc>
+            </a:pPr>
+            <a:r>
+              <a:rPr b="0" lang="en-US" sz="3600" spc="-1" strike="noStrike">
+                <a:solidFill>
+                  <a:srgbClr val="ffffff"/>
+                </a:solidFill>
+                <a:latin typeface="Arial"/>
+              </a:rPr>
+              <a:t>Software Engineering, cont’d.</a:t>
+            </a:r>
+            <a:endParaRPr b="0" lang="en-US" sz="3600" spc="-1" strike="noStrike">
+              <a:latin typeface="Arial"/>
+            </a:endParaRPr>
+          </a:p>
+        </p:txBody>
+      </p:sp>
       <p:pic>
         <p:nvPicPr>
-          <p:cNvPr id="162" name="" descr=""/>
+          <p:cNvPr id="202" name="" descr=""/>
           <p:cNvPicPr/>
           <p:nvPr/>
         </p:nvPicPr>
@@ -7524,8 +9262,8 @@
         </p:blipFill>
         <p:spPr>
           <a:xfrm>
-            <a:off x="9360" y="-12240"/>
-            <a:ext cx="10079280" cy="5479920"/>
+            <a:off x="0" y="1225800"/>
+            <a:ext cx="7497720" cy="4403160"/>
           </a:xfrm>
           <a:prstGeom prst="rect">
             <a:avLst/>
@@ -7567,7 +9305,7 @@
       </p:grpSpPr>
       <p:pic>
         <p:nvPicPr>
-          <p:cNvPr id="163" name="" descr=""/>
+          <p:cNvPr id="203" name="" descr=""/>
           <p:cNvPicPr/>
           <p:nvPr/>
         </p:nvPicPr>
@@ -7577,30 +9315,27 @@
         </p:blipFill>
         <p:spPr>
           <a:xfrm>
-            <a:off x="91440" y="1280160"/>
-            <a:ext cx="9943920" cy="3779640"/>
-          </a:xfrm>
-          <a:prstGeom prst="rect">
-            <a:avLst/>
-          </a:prstGeom>
-          <a:ln w="18360">
-            <a:solidFill>
-              <a:srgbClr val="808080"/>
-            </a:solidFill>
-            <a:round/>
+            <a:off x="30240" y="1308960"/>
+            <a:ext cx="10078920" cy="4363200"/>
+          </a:xfrm>
+          <a:prstGeom prst="rect">
+            <a:avLst/>
+          </a:prstGeom>
+          <a:ln>
+            <a:noFill/>
           </a:ln>
         </p:spPr>
       </p:pic>
       <p:sp>
         <p:nvSpPr>
-          <p:cNvPr id="164" name="CustomShape 1"/>
+          <p:cNvPr id="204" name="CustomShape 1"/>
           <p:cNvSpPr/>
           <p:nvPr/>
         </p:nvSpPr>
         <p:spPr>
           <a:xfrm>
-            <a:off x="504000" y="140760"/>
-            <a:ext cx="7019640" cy="1086480"/>
+            <a:off x="504000" y="439560"/>
+            <a:ext cx="7019280" cy="487800"/>
           </a:xfrm>
           <a:prstGeom prst="rect">
             <a:avLst/>
@@ -7627,62 +9362,16 @@
               </a:lnSpc>
             </a:pPr>
             <a:r>
-              <a:rPr b="0" lang="en-US" sz="3570" spc="-1" strike="noStrike">
+              <a:rPr b="0" lang="en-US" sz="3200" spc="-1" strike="noStrike">
                 <a:solidFill>
                   <a:srgbClr val="ffffff"/>
                 </a:solidFill>
                 <a:latin typeface="Arial"/>
+                <a:ea typeface="DejaVu Sans"/>
               </a:rPr>
-              <a:t>When to use a binary classifier for each class instead of softmax</a:t>
+              <a:t>Softmax definition and implementation</a:t>
             </a:r>
-            <a:endParaRPr b="0" lang="en-US" sz="3570" spc="-1" strike="noStrike">
-              <a:latin typeface="Arial"/>
-            </a:endParaRPr>
-          </a:p>
-        </p:txBody>
-      </p:sp>
-      <p:sp>
-        <p:nvSpPr>
-          <p:cNvPr id="165" name="CustomShape 2"/>
-          <p:cNvSpPr/>
-          <p:nvPr/>
-        </p:nvSpPr>
-        <p:spPr>
-          <a:xfrm>
-            <a:off x="8931600" y="2538360"/>
-            <a:ext cx="788400" cy="333000"/>
-          </a:xfrm>
-          <a:prstGeom prst="rect">
-            <a:avLst/>
-          </a:prstGeom>
-          <a:noFill/>
-          <a:ln>
-            <a:noFill/>
-          </a:ln>
-        </p:spPr>
-        <p:style>
-          <a:lnRef idx="0"/>
-          <a:fillRef idx="0"/>
-          <a:effectRef idx="0"/>
-          <a:fontRef idx="minor"/>
-        </p:style>
-        <p:txBody>
-          <a:bodyPr lIns="90000" rIns="90000" tIns="45000" bIns="45000">
-            <a:spAutoFit/>
-          </a:bodyPr>
-          <a:p>
-            <a:pPr>
-              <a:lnSpc>
-                <a:spcPct val="100000"/>
-              </a:lnSpc>
-            </a:pPr>
-            <a:r>
-              <a:rPr b="1" lang="en-US" sz="1600" spc="-1" strike="noStrike">
-                <a:latin typeface="Arial"/>
-              </a:rPr>
-              <a:t>binary</a:t>
-            </a:r>
-            <a:endParaRPr b="0" lang="en-US" sz="1600" spc="-1" strike="noStrike">
+            <a:endParaRPr b="0" lang="en-US" sz="3200" spc="-1" strike="noStrike">
               <a:latin typeface="Arial"/>
             </a:endParaRPr>
           </a:p>
@@ -7718,59 +9407,9 @@
           <a:chExt cx="0" cy="0"/>
         </a:xfrm>
       </p:grpSpPr>
-      <p:sp>
-        <p:nvSpPr>
-          <p:cNvPr id="166" name="CustomShape 1"/>
-          <p:cNvSpPr/>
-          <p:nvPr/>
-        </p:nvSpPr>
-        <p:spPr>
-          <a:xfrm>
-            <a:off x="504000" y="256680"/>
-            <a:ext cx="7019640" cy="853920"/>
-          </a:xfrm>
-          <a:prstGeom prst="rect">
-            <a:avLst/>
-          </a:prstGeom>
-          <a:noFill/>
-          <a:ln>
-            <a:noFill/>
-          </a:ln>
-        </p:spPr>
-        <p:style>
-          <a:lnRef idx="0"/>
-          <a:fillRef idx="0"/>
-          <a:effectRef idx="0"/>
-          <a:fontRef idx="minor"/>
-        </p:style>
-        <p:txBody>
-          <a:bodyPr lIns="0" rIns="0" tIns="0" bIns="0" anchor="ctr">
-            <a:spAutoFit/>
-          </a:bodyPr>
-          <a:p>
-            <a:pPr>
-              <a:lnSpc>
-                <a:spcPct val="100000"/>
-              </a:lnSpc>
-            </a:pPr>
-            <a:r>
-              <a:rPr b="0" lang="en-US" sz="2800" spc="-1" strike="noStrike">
-                <a:solidFill>
-                  <a:srgbClr val="ffffff"/>
-                </a:solidFill>
-                <a:latin typeface="Arial"/>
-              </a:rPr>
-              <a:t>What does softmax do when two samples have weights that differ by a constant?</a:t>
-            </a:r>
-            <a:endParaRPr b="0" lang="en-US" sz="2800" spc="-1" strike="noStrike">
-              <a:latin typeface="Arial"/>
-            </a:endParaRPr>
-          </a:p>
-        </p:txBody>
-      </p:sp>
       <p:pic>
         <p:nvPicPr>
-          <p:cNvPr id="167" name="" descr=""/>
+          <p:cNvPr id="205" name="" descr=""/>
           <p:cNvPicPr/>
           <p:nvPr/>
         </p:nvPicPr>
@@ -7780,8 +9419,8 @@
         </p:blipFill>
         <p:spPr>
           <a:xfrm>
-            <a:off x="0" y="1188720"/>
-            <a:ext cx="10079280" cy="4429800"/>
+            <a:off x="9360" y="-12240"/>
+            <a:ext cx="10078920" cy="5479560"/>
           </a:xfrm>
           <a:prstGeom prst="rect">
             <a:avLst/>
@@ -7821,59 +9460,9 @@
           <a:chExt cx="0" cy="0"/>
         </a:xfrm>
       </p:grpSpPr>
-      <p:sp>
-        <p:nvSpPr>
-          <p:cNvPr id="168" name="CustomShape 1"/>
-          <p:cNvSpPr/>
-          <p:nvPr/>
-        </p:nvSpPr>
-        <p:spPr>
-          <a:xfrm>
-            <a:off x="504000" y="44280"/>
-            <a:ext cx="7019640" cy="1279080"/>
-          </a:xfrm>
-          <a:prstGeom prst="rect">
-            <a:avLst/>
-          </a:prstGeom>
-          <a:noFill/>
-          <a:ln>
-            <a:noFill/>
-          </a:ln>
-        </p:spPr>
-        <p:style>
-          <a:lnRef idx="0"/>
-          <a:fillRef idx="0"/>
-          <a:effectRef idx="0"/>
-          <a:fontRef idx="minor"/>
-        </p:style>
-        <p:txBody>
-          <a:bodyPr lIns="0" rIns="0" tIns="0" bIns="0" anchor="ctr">
-            <a:spAutoFit/>
-          </a:bodyPr>
-          <a:p>
-            <a:pPr>
-              <a:lnSpc>
-                <a:spcPct val="100000"/>
-              </a:lnSpc>
-            </a:pPr>
-            <a:r>
-              <a:rPr b="0" lang="en-US" sz="2800" spc="-1" strike="noStrike">
-                <a:solidFill>
-                  <a:srgbClr val="ffffff"/>
-                </a:solidFill>
-                <a:latin typeface="Arial"/>
-              </a:rPr>
-              <a:t>What does softmax do when two samples have weights that differ by a constant? cont’d</a:t>
-            </a:r>
-            <a:endParaRPr b="0" lang="en-US" sz="2800" spc="-1" strike="noStrike">
-              <a:latin typeface="Arial"/>
-            </a:endParaRPr>
-          </a:p>
-        </p:txBody>
-      </p:sp>
       <p:pic>
         <p:nvPicPr>
-          <p:cNvPr id="169" name="" descr=""/>
+          <p:cNvPr id="206" name="" descr=""/>
           <p:cNvPicPr/>
           <p:nvPr/>
         </p:nvPicPr>
@@ -7883,8 +9472,8 @@
         </p:blipFill>
         <p:spPr>
           <a:xfrm>
-            <a:off x="0" y="1302120"/>
-            <a:ext cx="7863480" cy="4330440"/>
+            <a:off x="6480" y="-8640"/>
+            <a:ext cx="8015040" cy="5294880"/>
           </a:xfrm>
           <a:prstGeom prst="rect">
             <a:avLst/>
@@ -7926,7 +9515,7 @@
       </p:grpSpPr>
       <p:pic>
         <p:nvPicPr>
-          <p:cNvPr id="170" name="" descr=""/>
+          <p:cNvPr id="207" name="" descr=""/>
           <p:cNvPicPr/>
           <p:nvPr/>
         </p:nvPicPr>
@@ -7936,17 +9525,122 @@
         </p:blipFill>
         <p:spPr>
           <a:xfrm>
-            <a:off x="6480" y="-8640"/>
-            <a:ext cx="8015400" cy="5295240"/>
-          </a:xfrm>
-          <a:prstGeom prst="rect">
-            <a:avLst/>
-          </a:prstGeom>
+            <a:off x="23400" y="1280160"/>
+            <a:ext cx="9943560" cy="3779280"/>
+          </a:xfrm>
+          <a:prstGeom prst="rect">
+            <a:avLst/>
+          </a:prstGeom>
+          <a:ln w="18360">
+            <a:solidFill>
+              <a:srgbClr val="808080"/>
+            </a:solidFill>
+            <a:round/>
+          </a:ln>
+        </p:spPr>
+      </p:pic>
+      <p:sp>
+        <p:nvSpPr>
+          <p:cNvPr id="208" name="CustomShape 1"/>
+          <p:cNvSpPr/>
+          <p:nvPr/>
+        </p:nvSpPr>
+        <p:spPr>
+          <a:xfrm>
+            <a:off x="504000" y="140760"/>
+            <a:ext cx="7019280" cy="1086480"/>
+          </a:xfrm>
+          <a:prstGeom prst="rect">
+            <a:avLst/>
+          </a:prstGeom>
+          <a:noFill/>
           <a:ln>
             <a:noFill/>
           </a:ln>
         </p:spPr>
-      </p:pic>
+        <p:style>
+          <a:lnRef idx="0"/>
+          <a:fillRef idx="0"/>
+          <a:effectRef idx="0"/>
+          <a:fontRef idx="minor"/>
+        </p:style>
+        <p:txBody>
+          <a:bodyPr lIns="0" rIns="0" tIns="0" bIns="0" anchor="ctr">
+            <a:spAutoFit/>
+          </a:bodyPr>
+          <a:p>
+            <a:pPr>
+              <a:lnSpc>
+                <a:spcPct val="100000"/>
+              </a:lnSpc>
+            </a:pPr>
+            <a:r>
+              <a:rPr b="0" lang="en-US" sz="3570" spc="-1" strike="noStrike">
+                <a:solidFill>
+                  <a:srgbClr val="ffffff"/>
+                </a:solidFill>
+                <a:latin typeface="Arial"/>
+                <a:ea typeface="DejaVu Sans"/>
+              </a:rPr>
+              <a:t>When to use a binary classifier for each class instead of softmax</a:t>
+            </a:r>
+            <a:endParaRPr b="0" lang="en-US" sz="3570" spc="-1" strike="noStrike">
+              <a:latin typeface="Arial"/>
+            </a:endParaRPr>
+          </a:p>
+        </p:txBody>
+      </p:sp>
+      <p:sp>
+        <p:nvSpPr>
+          <p:cNvPr id="209" name="CustomShape 2"/>
+          <p:cNvSpPr/>
+          <p:nvPr/>
+        </p:nvSpPr>
+        <p:spPr>
+          <a:xfrm>
+            <a:off x="8931600" y="2538360"/>
+            <a:ext cx="788040" cy="333000"/>
+          </a:xfrm>
+          <a:prstGeom prst="rect">
+            <a:avLst/>
+          </a:prstGeom>
+          <a:noFill/>
+          <a:ln>
+            <a:noFill/>
+          </a:ln>
+        </p:spPr>
+        <p:style>
+          <a:lnRef idx="0"/>
+          <a:fillRef idx="0"/>
+          <a:effectRef idx="0"/>
+          <a:fontRef idx="minor"/>
+        </p:style>
+        <p:txBody>
+          <a:bodyPr lIns="90000" rIns="90000" tIns="45000" bIns="45000">
+            <a:spAutoFit/>
+          </a:bodyPr>
+          <a:p>
+            <a:pPr>
+              <a:lnSpc>
+                <a:spcPct val="100000"/>
+              </a:lnSpc>
+            </a:pPr>
+            <a:r>
+              <a:rPr b="1" lang="en-US" sz="1600" spc="-1" strike="noStrike">
+                <a:solidFill>
+                  <a:srgbClr val="000000"/>
+                </a:solidFill>
+                <a:latin typeface="Arial"/>
+                <a:ea typeface="DejaVu Sans"/>
+              </a:rPr>
+              <a:t>binary</a:t>
+            </a:r>
+            <a:endParaRPr b="0" lang="en-US" sz="1600" spc="-1" strike="noStrike">
+              <a:latin typeface="Arial"/>
+            </a:endParaRPr>
+          </a:p>
+        </p:txBody>
+      </p:sp>
     </p:spTree>
   </p:cSld>
   <mc:AlternateContent>
@@ -7979,14 +9673,14 @@
       </p:grpSpPr>
       <p:sp>
         <p:nvSpPr>
-          <p:cNvPr id="171" name="TextShape 1"/>
-          <p:cNvSpPr txBox="1"/>
+          <p:cNvPr id="210" name="CustomShape 1"/>
+          <p:cNvSpPr/>
           <p:nvPr/>
         </p:nvSpPr>
         <p:spPr>
           <a:xfrm>
-            <a:off x="504000" y="210600"/>
-            <a:ext cx="7019640" cy="946800"/>
+            <a:off x="504000" y="256680"/>
+            <a:ext cx="7019280" cy="853560"/>
           </a:xfrm>
           <a:prstGeom prst="rect">
             <a:avLst/>
@@ -7996,25 +9690,33 @@
             <a:noFill/>
           </a:ln>
         </p:spPr>
+        <p:style>
+          <a:lnRef idx="0"/>
+          <a:fillRef idx="0"/>
+          <a:effectRef idx="0"/>
+          <a:fontRef idx="minor"/>
+        </p:style>
         <p:txBody>
           <a:bodyPr lIns="0" rIns="0" tIns="0" bIns="0" anchor="ctr">
             <a:spAutoFit/>
           </a:bodyPr>
           <a:p>
-            <a:pPr algn="ctr"/>
+            <a:pPr>
+              <a:lnSpc>
+                <a:spcPct val="100000"/>
+              </a:lnSpc>
+            </a:pPr>
             <a:r>
-              <a:rPr b="0" lang="en-US" sz="3600" spc="-1" strike="noStrike">
+              <a:rPr b="0" lang="en-US" sz="2800" spc="-1" strike="noStrike">
                 <a:solidFill>
                   <a:srgbClr val="ffffff"/>
                 </a:solidFill>
                 <a:latin typeface="Arial"/>
+                <a:ea typeface="DejaVu Sans"/>
               </a:rPr>
-              <a:t>A Note on Software Engineering</a:t>
+              <a:t>What does softmax do when two samples have weights that differ by a constant?</a:t>
             </a:r>
-            <a:endParaRPr b="0" lang="en-US" sz="3600" spc="-1" strike="noStrike">
-              <a:solidFill>
-                <a:srgbClr val="ffffff"/>
-              </a:solidFill>
+            <a:endParaRPr b="0" lang="en-US" sz="2800" spc="-1" strike="noStrike">
               <a:latin typeface="Arial"/>
             </a:endParaRPr>
           </a:p>
@@ -8022,7 +9724,7 @@
       </p:sp>
       <p:pic>
         <p:nvPicPr>
-          <p:cNvPr id="172" name="" descr=""/>
+          <p:cNvPr id="211" name="" descr=""/>
           <p:cNvPicPr/>
           <p:nvPr/>
         </p:nvPicPr>
@@ -8032,8 +9734,8 @@
         </p:blipFill>
         <p:spPr>
           <a:xfrm>
-            <a:off x="1188720" y="1280160"/>
-            <a:ext cx="7863840" cy="4365360"/>
+            <a:off x="0" y="1188720"/>
+            <a:ext cx="10078920" cy="4429440"/>
           </a:xfrm>
           <a:prstGeom prst="rect">
             <a:avLst/>
@@ -8946,4 +10648,227 @@
     </a:fmtScheme>
   </a:themeElements>
 </a:theme>
+</file>
+
+<file path=ppt/theme/theme5.xml><?xml version="1.0" encoding="utf-8"?>
+<a:theme xmlns:a="http://schemas.openxmlformats.org/drawingml/2006/main" name="Office Theme">
+  <a:themeElements>
+    <a:clrScheme name="Office">
+      <a:dk1>
+        <a:sysClr val="windowText" lastClr="000000"/>
+      </a:dk1>
+      <a:lt1>
+        <a:sysClr val="window" lastClr="FFFFFF"/>
+      </a:lt1>
+      <a:dk2>
+        <a:srgbClr val="1f497d"/>
+      </a:dk2>
+      <a:lt2>
+        <a:srgbClr val="eeece1"/>
+      </a:lt2>
+      <a:accent1>
+        <a:srgbClr val="4f81bd"/>
+      </a:accent1>
+      <a:accent2>
+        <a:srgbClr val="c0504d"/>
+      </a:accent2>
+      <a:accent3>
+        <a:srgbClr val="9bbb59"/>
+      </a:accent3>
+      <a:accent4>
+        <a:srgbClr val="8064a2"/>
+      </a:accent4>
+      <a:accent5>
+        <a:srgbClr val="4bacc6"/>
+      </a:accent5>
+      <a:accent6>
+        <a:srgbClr val="f79646"/>
+      </a:accent6>
+      <a:hlink>
+        <a:srgbClr val="0000ff"/>
+      </a:hlink>
+      <a:folHlink>
+        <a:srgbClr val="800080"/>
+      </a:folHlink>
+    </a:clrScheme>
+    <a:fontScheme name="Office">
+      <a:majorFont>
+        <a:latin typeface="Arial"/>
+        <a:ea typeface="DejaVu Sans"/>
+        <a:cs typeface="DejaVu Sans"/>
+      </a:majorFont>
+      <a:minorFont>
+        <a:latin typeface="Arial"/>
+        <a:ea typeface="DejaVu Sans"/>
+        <a:cs typeface="DejaVu Sans"/>
+      </a:minorFont>
+    </a:fontScheme>
+    <a:fmtScheme name="Office">
+      <a:fillStyleLst>
+        <a:solidFill>
+          <a:schemeClr val="phClr"/>
+        </a:solidFill>
+        <a:gradFill rotWithShape="1">
+          <a:gsLst>
+            <a:gs pos="0">
+              <a:schemeClr val="phClr">
+                <a:tint val="50000"/>
+                <a:satMod val="300000"/>
+              </a:schemeClr>
+            </a:gs>
+            <a:gs pos="35000">
+              <a:schemeClr val="phClr">
+                <a:tint val="37000"/>
+                <a:satMod val="300000"/>
+              </a:schemeClr>
+            </a:gs>
+            <a:gs pos="100000">
+              <a:schemeClr val="phClr">
+                <a:tint val="15000"/>
+                <a:satMod val="350000"/>
+              </a:schemeClr>
+            </a:gs>
+          </a:gsLst>
+          <a:lin ang="16200000" scaled="1"/>
+        </a:gradFill>
+        <a:gradFill rotWithShape="1">
+          <a:gsLst>
+            <a:gs pos="0">
+              <a:schemeClr val="phClr">
+                <a:shade val="51000"/>
+                <a:satMod val="130000"/>
+              </a:schemeClr>
+            </a:gs>
+            <a:gs pos="80000">
+              <a:schemeClr val="phClr">
+                <a:shade val="93000"/>
+                <a:satMod val="130000"/>
+              </a:schemeClr>
+            </a:gs>
+            <a:gs pos="100000">
+              <a:schemeClr val="phClr">
+                <a:shade val="94000"/>
+                <a:satMod val="135000"/>
+              </a:schemeClr>
+            </a:gs>
+          </a:gsLst>
+          <a:lin ang="16200000" scaled="0"/>
+        </a:gradFill>
+      </a:fillStyleLst>
+      <a:lnStyleLst>
+        <a:ln w="9525" cap="flat" cmpd="sng" algn="ctr">
+          <a:solidFill>
+            <a:schemeClr val="phClr">
+              <a:shade val="95000"/>
+              <a:satMod val="105000"/>
+            </a:schemeClr>
+          </a:solidFill>
+          <a:prstDash val="solid"/>
+        </a:ln>
+        <a:ln w="25400" cap="flat" cmpd="sng" algn="ctr">
+          <a:solidFill>
+            <a:schemeClr val="phClr"/>
+          </a:solidFill>
+          <a:prstDash val="solid"/>
+        </a:ln>
+        <a:ln w="38100" cap="flat" cmpd="sng" algn="ctr">
+          <a:solidFill>
+            <a:schemeClr val="phClr"/>
+          </a:solidFill>
+          <a:prstDash val="solid"/>
+        </a:ln>
+      </a:lnStyleLst>
+      <a:effectStyleLst>
+        <a:effectStyle>
+          <a:effectLst>
+            <a:outerShdw blurRad="40000" dist="20000" dir="5400000" rotWithShape="0">
+              <a:srgbClr val="000000">
+                <a:alpha val="38000"/>
+              </a:srgbClr>
+            </a:outerShdw>
+          </a:effectLst>
+        </a:effectStyle>
+        <a:effectStyle>
+          <a:effectLst>
+            <a:outerShdw blurRad="40000" dist="23000" dir="5400000" rotWithShape="0">
+              <a:srgbClr val="000000">
+                <a:alpha val="35000"/>
+              </a:srgbClr>
+            </a:outerShdw>
+          </a:effectLst>
+        </a:effectStyle>
+        <a:effectStyle>
+          <a:effectLst>
+            <a:outerShdw blurRad="40000" dist="23000" dir="5400000" rotWithShape="0">
+              <a:srgbClr val="000000">
+                <a:alpha val="35000"/>
+              </a:srgbClr>
+            </a:outerShdw>
+          </a:effectLst>
+          <a:scene3d>
+            <a:camera prst="orthographicFront">
+              <a:rot lat="0" lon="0" rev="0"/>
+            </a:camera>
+            <a:lightRig rig="threePt" dir="t">
+              <a:rot lat="0" lon="0" rev="1200000"/>
+            </a:lightRig>
+          </a:scene3d>
+          <a:sp3d>
+            <a:bevelT w="63500" h="25400"/>
+          </a:sp3d>
+        </a:effectStyle>
+      </a:effectStyleLst>
+      <a:bgFillStyleLst>
+        <a:solidFill>
+          <a:schemeClr val="phClr"/>
+        </a:solidFill>
+        <a:gradFill rotWithShape="1">
+          <a:gsLst>
+            <a:gs pos="0">
+              <a:schemeClr val="phClr">
+                <a:tint val="40000"/>
+                <a:satMod val="350000"/>
+              </a:schemeClr>
+            </a:gs>
+            <a:gs pos="40000">
+              <a:schemeClr val="phClr">
+                <a:tint val="45000"/>
+                <a:shade val="99000"/>
+                <a:satMod val="350000"/>
+              </a:schemeClr>
+            </a:gs>
+            <a:gs pos="100000">
+              <a:schemeClr val="phClr">
+                <a:shade val="20000"/>
+                <a:satMod val="255000"/>
+              </a:schemeClr>
+            </a:gs>
+          </a:gsLst>
+          <a:path path="circle">
+            <a:fillToRect l="50000" t="-80000" r="50000" b="180000"/>
+          </a:path>
+        </a:gradFill>
+        <a:gradFill rotWithShape="1">
+          <a:gsLst>
+            <a:gs pos="0">
+              <a:schemeClr val="phClr">
+                <a:tint val="80000"/>
+                <a:satMod val="300000"/>
+              </a:schemeClr>
+            </a:gs>
+            <a:gs pos="100000">
+              <a:schemeClr val="phClr">
+                <a:shade val="30000"/>
+                <a:satMod val="200000"/>
+              </a:schemeClr>
+            </a:gs>
+          </a:gsLst>
+          <a:path path="circle">
+            <a:fillToRect l="50000" t="50000" r="50000" b="50000"/>
+          </a:path>
+        </a:gradFill>
+      </a:bgFillStyleLst>
+    </a:fmtScheme>
+  </a:themeElements>
+</a:theme>
 </file>
</xml_diff>